<commit_message>
Updates from WS21 first days.
</commit_message>
<xml_diff>
--- a/intro.pptx
+++ b/intro.pptx
@@ -206,7 +206,7 @@
           <a:p>
             <a:fld id="{C8CB6DD3-06B5-4ACC-BB04-17EA348F31CB}" type="datetimeFigureOut">
               <a:rPr lang="en-US" smtClean="0"/>
-              <a:t>3/19/2022</a:t>
+              <a:t>3/27/2022</a:t>
             </a:fld>
             <a:endParaRPr lang="en-US"/>
           </a:p>
@@ -620,7 +620,7 @@
           <a:p>
             <a:fld id="{64A2CC85-5047-40E1-9882-E305A1981D35}" type="datetimeFigureOut">
               <a:rPr lang="en-US" smtClean="0"/>
-              <a:t>3/19/2022</a:t>
+              <a:t>3/27/2022</a:t>
             </a:fld>
             <a:endParaRPr lang="en-US"/>
           </a:p>
@@ -818,7 +818,7 @@
           <a:p>
             <a:fld id="{64A2CC85-5047-40E1-9882-E305A1981D35}" type="datetimeFigureOut">
               <a:rPr lang="en-US" smtClean="0"/>
-              <a:t>3/19/2022</a:t>
+              <a:t>3/27/2022</a:t>
             </a:fld>
             <a:endParaRPr lang="en-US"/>
           </a:p>
@@ -1026,7 +1026,7 @@
           <a:p>
             <a:fld id="{64A2CC85-5047-40E1-9882-E305A1981D35}" type="datetimeFigureOut">
               <a:rPr lang="en-US" smtClean="0"/>
-              <a:t>3/19/2022</a:t>
+              <a:t>3/27/2022</a:t>
             </a:fld>
             <a:endParaRPr lang="en-US"/>
           </a:p>
@@ -1224,7 +1224,7 @@
           <a:p>
             <a:fld id="{64A2CC85-5047-40E1-9882-E305A1981D35}" type="datetimeFigureOut">
               <a:rPr lang="en-US" smtClean="0"/>
-              <a:t>3/19/2022</a:t>
+              <a:t>3/27/2022</a:t>
             </a:fld>
             <a:endParaRPr lang="en-US"/>
           </a:p>
@@ -1499,7 +1499,7 @@
           <a:p>
             <a:fld id="{64A2CC85-5047-40E1-9882-E305A1981D35}" type="datetimeFigureOut">
               <a:rPr lang="en-US" smtClean="0"/>
-              <a:t>3/19/2022</a:t>
+              <a:t>3/27/2022</a:t>
             </a:fld>
             <a:endParaRPr lang="en-US"/>
           </a:p>
@@ -1764,7 +1764,7 @@
           <a:p>
             <a:fld id="{64A2CC85-5047-40E1-9882-E305A1981D35}" type="datetimeFigureOut">
               <a:rPr lang="en-US" smtClean="0"/>
-              <a:t>3/19/2022</a:t>
+              <a:t>3/27/2022</a:t>
             </a:fld>
             <a:endParaRPr lang="en-US"/>
           </a:p>
@@ -2176,7 +2176,7 @@
           <a:p>
             <a:fld id="{64A2CC85-5047-40E1-9882-E305A1981D35}" type="datetimeFigureOut">
               <a:rPr lang="en-US" smtClean="0"/>
-              <a:t>3/19/2022</a:t>
+              <a:t>3/27/2022</a:t>
             </a:fld>
             <a:endParaRPr lang="en-US"/>
           </a:p>
@@ -2317,7 +2317,7 @@
           <a:p>
             <a:fld id="{64A2CC85-5047-40E1-9882-E305A1981D35}" type="datetimeFigureOut">
               <a:rPr lang="en-US" smtClean="0"/>
-              <a:t>3/19/2022</a:t>
+              <a:t>3/27/2022</a:t>
             </a:fld>
             <a:endParaRPr lang="en-US"/>
           </a:p>
@@ -2430,7 +2430,7 @@
           <a:p>
             <a:fld id="{64A2CC85-5047-40E1-9882-E305A1981D35}" type="datetimeFigureOut">
               <a:rPr lang="en-US" smtClean="0"/>
-              <a:t>3/19/2022</a:t>
+              <a:t>3/27/2022</a:t>
             </a:fld>
             <a:endParaRPr lang="en-US"/>
           </a:p>
@@ -2741,7 +2741,7 @@
           <a:p>
             <a:fld id="{64A2CC85-5047-40E1-9882-E305A1981D35}" type="datetimeFigureOut">
               <a:rPr lang="en-US" smtClean="0"/>
-              <a:t>3/19/2022</a:t>
+              <a:t>3/27/2022</a:t>
             </a:fld>
             <a:endParaRPr lang="en-US"/>
           </a:p>
@@ -3029,7 +3029,7 @@
           <a:p>
             <a:fld id="{64A2CC85-5047-40E1-9882-E305A1981D35}" type="datetimeFigureOut">
               <a:rPr lang="en-US" smtClean="0"/>
-              <a:t>3/19/2022</a:t>
+              <a:t>3/27/2022</a:t>
             </a:fld>
             <a:endParaRPr lang="en-US"/>
           </a:p>
@@ -3270,7 +3270,7 @@
           <a:p>
             <a:fld id="{64A2CC85-5047-40E1-9882-E305A1981D35}" type="datetimeFigureOut">
               <a:rPr lang="en-US" smtClean="0"/>
-              <a:t>3/19/2022</a:t>
+              <a:t>3/27/2022</a:t>
             </a:fld>
             <a:endParaRPr lang="en-US"/>
           </a:p>
@@ -4011,6 +4011,16 @@
           <a:p>
             <a:pPr algn="ctr"/>
             <a:r>
+              <a:rPr lang="en-US" sz="2400">
+                <a:solidFill>
+                  <a:schemeClr val="accent2"/>
+                </a:solidFill>
+                <a:latin typeface="Roboto Light" panose="02000000000000000000" pitchFamily="2" charset="0"/>
+                <a:ea typeface="Roboto Light" panose="02000000000000000000" pitchFamily="2" charset="0"/>
+              </a:rPr>
+              <a:t>git clone </a:t>
+            </a:r>
+            <a:r>
               <a:rPr lang="en-US" sz="2400" dirty="0">
                 <a:solidFill>
                   <a:schemeClr val="accent2"/>
@@ -4018,7 +4028,7 @@
                 <a:latin typeface="Roboto Light" panose="02000000000000000000" pitchFamily="2" charset="0"/>
                 <a:ea typeface="Roboto Light" panose="02000000000000000000" pitchFamily="2" charset="0"/>
               </a:rPr>
-              <a:t>git pull https://github.com/nelson-group/pycourse.git</a:t>
+              <a:t>https://github.com/nelson-group/pycourse.git</a:t>
             </a:r>
           </a:p>
           <a:p>

</xml_diff>

<commit_message>
Last tweaks and edits based on WS21.
</commit_message>
<xml_diff>
--- a/intro.pptx
+++ b/intro.pptx
@@ -206,7 +206,7 @@
           <a:p>
             <a:fld id="{C8CB6DD3-06B5-4ACC-BB04-17EA348F31CB}" type="datetimeFigureOut">
               <a:rPr lang="en-US" smtClean="0"/>
-              <a:t>3/27/2022</a:t>
+              <a:t>4/1/2022</a:t>
             </a:fld>
             <a:endParaRPr lang="en-US"/>
           </a:p>
@@ -620,7 +620,7 @@
           <a:p>
             <a:fld id="{64A2CC85-5047-40E1-9882-E305A1981D35}" type="datetimeFigureOut">
               <a:rPr lang="en-US" smtClean="0"/>
-              <a:t>3/27/2022</a:t>
+              <a:t>4/1/2022</a:t>
             </a:fld>
             <a:endParaRPr lang="en-US"/>
           </a:p>
@@ -818,7 +818,7 @@
           <a:p>
             <a:fld id="{64A2CC85-5047-40E1-9882-E305A1981D35}" type="datetimeFigureOut">
               <a:rPr lang="en-US" smtClean="0"/>
-              <a:t>3/27/2022</a:t>
+              <a:t>4/1/2022</a:t>
             </a:fld>
             <a:endParaRPr lang="en-US"/>
           </a:p>
@@ -1026,7 +1026,7 @@
           <a:p>
             <a:fld id="{64A2CC85-5047-40E1-9882-E305A1981D35}" type="datetimeFigureOut">
               <a:rPr lang="en-US" smtClean="0"/>
-              <a:t>3/27/2022</a:t>
+              <a:t>4/1/2022</a:t>
             </a:fld>
             <a:endParaRPr lang="en-US"/>
           </a:p>
@@ -1224,7 +1224,7 @@
           <a:p>
             <a:fld id="{64A2CC85-5047-40E1-9882-E305A1981D35}" type="datetimeFigureOut">
               <a:rPr lang="en-US" smtClean="0"/>
-              <a:t>3/27/2022</a:t>
+              <a:t>4/1/2022</a:t>
             </a:fld>
             <a:endParaRPr lang="en-US"/>
           </a:p>
@@ -1499,7 +1499,7 @@
           <a:p>
             <a:fld id="{64A2CC85-5047-40E1-9882-E305A1981D35}" type="datetimeFigureOut">
               <a:rPr lang="en-US" smtClean="0"/>
-              <a:t>3/27/2022</a:t>
+              <a:t>4/1/2022</a:t>
             </a:fld>
             <a:endParaRPr lang="en-US"/>
           </a:p>
@@ -1764,7 +1764,7 @@
           <a:p>
             <a:fld id="{64A2CC85-5047-40E1-9882-E305A1981D35}" type="datetimeFigureOut">
               <a:rPr lang="en-US" smtClean="0"/>
-              <a:t>3/27/2022</a:t>
+              <a:t>4/1/2022</a:t>
             </a:fld>
             <a:endParaRPr lang="en-US"/>
           </a:p>
@@ -2176,7 +2176,7 @@
           <a:p>
             <a:fld id="{64A2CC85-5047-40E1-9882-E305A1981D35}" type="datetimeFigureOut">
               <a:rPr lang="en-US" smtClean="0"/>
-              <a:t>3/27/2022</a:t>
+              <a:t>4/1/2022</a:t>
             </a:fld>
             <a:endParaRPr lang="en-US"/>
           </a:p>
@@ -2317,7 +2317,7 @@
           <a:p>
             <a:fld id="{64A2CC85-5047-40E1-9882-E305A1981D35}" type="datetimeFigureOut">
               <a:rPr lang="en-US" smtClean="0"/>
-              <a:t>3/27/2022</a:t>
+              <a:t>4/1/2022</a:t>
             </a:fld>
             <a:endParaRPr lang="en-US"/>
           </a:p>
@@ -2430,7 +2430,7 @@
           <a:p>
             <a:fld id="{64A2CC85-5047-40E1-9882-E305A1981D35}" type="datetimeFigureOut">
               <a:rPr lang="en-US" smtClean="0"/>
-              <a:t>3/27/2022</a:t>
+              <a:t>4/1/2022</a:t>
             </a:fld>
             <a:endParaRPr lang="en-US"/>
           </a:p>
@@ -2741,7 +2741,7 @@
           <a:p>
             <a:fld id="{64A2CC85-5047-40E1-9882-E305A1981D35}" type="datetimeFigureOut">
               <a:rPr lang="en-US" smtClean="0"/>
-              <a:t>3/27/2022</a:t>
+              <a:t>4/1/2022</a:t>
             </a:fld>
             <a:endParaRPr lang="en-US"/>
           </a:p>
@@ -3029,7 +3029,7 @@
           <a:p>
             <a:fld id="{64A2CC85-5047-40E1-9882-E305A1981D35}" type="datetimeFigureOut">
               <a:rPr lang="en-US" smtClean="0"/>
-              <a:t>3/27/2022</a:t>
+              <a:t>4/1/2022</a:t>
             </a:fld>
             <a:endParaRPr lang="en-US"/>
           </a:p>
@@ -3270,7 +3270,7 @@
           <a:p>
             <a:fld id="{64A2CC85-5047-40E1-9882-E305A1981D35}" type="datetimeFigureOut">
               <a:rPr lang="en-US" smtClean="0"/>
-              <a:t>3/27/2022</a:t>
+              <a:t>4/1/2022</a:t>
             </a:fld>
             <a:endParaRPr lang="en-US"/>
           </a:p>
@@ -5547,7 +5547,7 @@
                 <a:latin typeface="Roboto Light" panose="02000000000000000000" pitchFamily="2" charset="0"/>
                 <a:ea typeface="Roboto Light" panose="02000000000000000000" pitchFamily="2" charset="0"/>
               </a:rPr>
-              <a:t>Matplotlib</a:t>
+              <a:t>Matplotlib – add 3d</a:t>
             </a:r>
           </a:p>
           <a:p>
@@ -5573,7 +5573,7 @@
                 <a:latin typeface="Roboto Light" panose="02000000000000000000" pitchFamily="2" charset="0"/>
                 <a:ea typeface="Roboto Light" panose="02000000000000000000" pitchFamily="2" charset="0"/>
               </a:rPr>
-              <a:t>Classes, object-oriented programming, decorators</a:t>
+              <a:t>Classes, object-oriented programming, decorators - slower</a:t>
             </a:r>
           </a:p>
           <a:p>
@@ -5632,8 +5632,19 @@
                 <a:latin typeface="Roboto Light" panose="02000000000000000000" pitchFamily="2" charset="0"/>
                 <a:ea typeface="Roboto Light" panose="02000000000000000000" pitchFamily="2" charset="0"/>
               </a:rPr>
-              <a:t>Parallel programming: threading, multiprocessing</a:t>
-            </a:r>
+              <a:t>Parallel programming: threading, multiprocessing (slower </a:t>
+            </a:r>
+            <a:r>
+              <a:rPr lang="en-US">
+                <a:latin typeface="Roboto Light" panose="02000000000000000000" pitchFamily="2" charset="0"/>
+                <a:ea typeface="Roboto Light" panose="02000000000000000000" pitchFamily="2" charset="0"/>
+              </a:rPr>
+              <a:t>if possible)</a:t>
+            </a:r>
+            <a:endParaRPr lang="en-US" dirty="0">
+              <a:latin typeface="Roboto Light" panose="02000000000000000000" pitchFamily="2" charset="0"/>
+              <a:ea typeface="Roboto Light" panose="02000000000000000000" pitchFamily="2" charset="0"/>
+            </a:endParaRPr>
           </a:p>
           <a:p>
             <a:pPr marL="742950" lvl="1" indent="-285750">

</xml_diff>

<commit_message>
Update slides for SS22.
</commit_message>
<xml_diff>
--- a/intro.pptx
+++ b/intro.pptx
@@ -3733,7 +3733,7 @@
                 <a:latin typeface="Roboto Light" panose="02000000000000000000" pitchFamily="2" charset="0"/>
                 <a:ea typeface="Roboto Light" panose="02000000000000000000" pitchFamily="2" charset="0"/>
               </a:rPr>
-              <a:t>(Group 7)</a:t>
+              <a:t>(Group 8)</a:t>
             </a:r>
             <a:br>
               <a:rPr lang="en-US" dirty="0">
@@ -6988,7 +6988,27 @@
                 <a:latin typeface="Roboto Light" panose="02000000000000000000" pitchFamily="2" charset="0"/>
                 <a:ea typeface="Roboto Light" panose="02000000000000000000" pitchFamily="2" charset="0"/>
               </a:rPr>
-              <a:t>Due date: Friday April 8 @17h</a:t>
+              <a:t>Due date: Friday </a:t>
+            </a:r>
+            <a:r>
+              <a:rPr lang="en-US" b="1">
+                <a:solidFill>
+                  <a:schemeClr val="accent2"/>
+                </a:solidFill>
+                <a:latin typeface="Roboto Light" panose="02000000000000000000" pitchFamily="2" charset="0"/>
+                <a:ea typeface="Roboto Light" panose="02000000000000000000" pitchFamily="2" charset="0"/>
+              </a:rPr>
+              <a:t>October 7 </a:t>
+            </a:r>
+            <a:r>
+              <a:rPr lang="en-US" b="1" dirty="0">
+                <a:solidFill>
+                  <a:schemeClr val="accent2"/>
+                </a:solidFill>
+                <a:latin typeface="Roboto Light" panose="02000000000000000000" pitchFamily="2" charset="0"/>
+                <a:ea typeface="Roboto Light" panose="02000000000000000000" pitchFamily="2" charset="0"/>
+              </a:rPr>
+              <a:t>@17h</a:t>
             </a:r>
             <a:r>
               <a:rPr lang="en-US" dirty="0">

</xml_diff>

<commit_message>
Update intro slides (simplify, bigger).
</commit_message>
<xml_diff>
--- a/intro.pptx
+++ b/intro.pptx
@@ -5,19 +5,18 @@
     <p:sldMasterId id="2147483648" r:id="rId1"/>
   </p:sldMasterIdLst>
   <p:notesMasterIdLst>
-    <p:notesMasterId r:id="rId12"/>
+    <p:notesMasterId r:id="rId11"/>
   </p:notesMasterIdLst>
   <p:sldIdLst>
     <p:sldId id="256" r:id="rId2"/>
     <p:sldId id="263" r:id="rId3"/>
     <p:sldId id="258" r:id="rId4"/>
     <p:sldId id="268" r:id="rId5"/>
-    <p:sldId id="264" r:id="rId6"/>
-    <p:sldId id="265" r:id="rId7"/>
-    <p:sldId id="259" r:id="rId8"/>
-    <p:sldId id="257" r:id="rId9"/>
-    <p:sldId id="260" r:id="rId10"/>
-    <p:sldId id="261" r:id="rId11"/>
+    <p:sldId id="265" r:id="rId6"/>
+    <p:sldId id="259" r:id="rId7"/>
+    <p:sldId id="257" r:id="rId8"/>
+    <p:sldId id="260" r:id="rId9"/>
+    <p:sldId id="261" r:id="rId10"/>
   </p:sldIdLst>
   <p:sldSz cx="9144000" cy="6858000" type="screen4x3"/>
   <p:notesSz cx="6858000" cy="9144000"/>
@@ -206,7 +205,7 @@
           <a:p>
             <a:fld id="{C8CB6DD3-06B5-4ACC-BB04-17EA348F31CB}" type="datetimeFigureOut">
               <a:rPr lang="en-US" smtClean="0"/>
-              <a:t>4/1/2022</a:t>
+              <a:t>9/26/2022</a:t>
             </a:fld>
             <a:endParaRPr lang="en-US"/>
           </a:p>
@@ -620,7 +619,7 @@
           <a:p>
             <a:fld id="{64A2CC85-5047-40E1-9882-E305A1981D35}" type="datetimeFigureOut">
               <a:rPr lang="en-US" smtClean="0"/>
-              <a:t>4/1/2022</a:t>
+              <a:t>9/26/2022</a:t>
             </a:fld>
             <a:endParaRPr lang="en-US"/>
           </a:p>
@@ -818,7 +817,7 @@
           <a:p>
             <a:fld id="{64A2CC85-5047-40E1-9882-E305A1981D35}" type="datetimeFigureOut">
               <a:rPr lang="en-US" smtClean="0"/>
-              <a:t>4/1/2022</a:t>
+              <a:t>9/26/2022</a:t>
             </a:fld>
             <a:endParaRPr lang="en-US"/>
           </a:p>
@@ -1026,7 +1025,7 @@
           <a:p>
             <a:fld id="{64A2CC85-5047-40E1-9882-E305A1981D35}" type="datetimeFigureOut">
               <a:rPr lang="en-US" smtClean="0"/>
-              <a:t>4/1/2022</a:t>
+              <a:t>9/26/2022</a:t>
             </a:fld>
             <a:endParaRPr lang="en-US"/>
           </a:p>
@@ -1224,7 +1223,7 @@
           <a:p>
             <a:fld id="{64A2CC85-5047-40E1-9882-E305A1981D35}" type="datetimeFigureOut">
               <a:rPr lang="en-US" smtClean="0"/>
-              <a:t>4/1/2022</a:t>
+              <a:t>9/26/2022</a:t>
             </a:fld>
             <a:endParaRPr lang="en-US"/>
           </a:p>
@@ -1499,7 +1498,7 @@
           <a:p>
             <a:fld id="{64A2CC85-5047-40E1-9882-E305A1981D35}" type="datetimeFigureOut">
               <a:rPr lang="en-US" smtClean="0"/>
-              <a:t>4/1/2022</a:t>
+              <a:t>9/26/2022</a:t>
             </a:fld>
             <a:endParaRPr lang="en-US"/>
           </a:p>
@@ -1764,7 +1763,7 @@
           <a:p>
             <a:fld id="{64A2CC85-5047-40E1-9882-E305A1981D35}" type="datetimeFigureOut">
               <a:rPr lang="en-US" smtClean="0"/>
-              <a:t>4/1/2022</a:t>
+              <a:t>9/26/2022</a:t>
             </a:fld>
             <a:endParaRPr lang="en-US"/>
           </a:p>
@@ -2176,7 +2175,7 @@
           <a:p>
             <a:fld id="{64A2CC85-5047-40E1-9882-E305A1981D35}" type="datetimeFigureOut">
               <a:rPr lang="en-US" smtClean="0"/>
-              <a:t>4/1/2022</a:t>
+              <a:t>9/26/2022</a:t>
             </a:fld>
             <a:endParaRPr lang="en-US"/>
           </a:p>
@@ -2317,7 +2316,7 @@
           <a:p>
             <a:fld id="{64A2CC85-5047-40E1-9882-E305A1981D35}" type="datetimeFigureOut">
               <a:rPr lang="en-US" smtClean="0"/>
-              <a:t>4/1/2022</a:t>
+              <a:t>9/26/2022</a:t>
             </a:fld>
             <a:endParaRPr lang="en-US"/>
           </a:p>
@@ -2430,7 +2429,7 @@
           <a:p>
             <a:fld id="{64A2CC85-5047-40E1-9882-E305A1981D35}" type="datetimeFigureOut">
               <a:rPr lang="en-US" smtClean="0"/>
-              <a:t>4/1/2022</a:t>
+              <a:t>9/26/2022</a:t>
             </a:fld>
             <a:endParaRPr lang="en-US"/>
           </a:p>
@@ -2741,7 +2740,7 @@
           <a:p>
             <a:fld id="{64A2CC85-5047-40E1-9882-E305A1981D35}" type="datetimeFigureOut">
               <a:rPr lang="en-US" smtClean="0"/>
-              <a:t>4/1/2022</a:t>
+              <a:t>9/26/2022</a:t>
             </a:fld>
             <a:endParaRPr lang="en-US"/>
           </a:p>
@@ -3029,7 +3028,7 @@
           <a:p>
             <a:fld id="{64A2CC85-5047-40E1-9882-E305A1981D35}" type="datetimeFigureOut">
               <a:rPr lang="en-US" smtClean="0"/>
-              <a:t>4/1/2022</a:t>
+              <a:t>9/26/2022</a:t>
             </a:fld>
             <a:endParaRPr lang="en-US"/>
           </a:p>
@@ -3270,7 +3269,7 @@
           <a:p>
             <a:fld id="{64A2CC85-5047-40E1-9882-E305A1981D35}" type="datetimeFigureOut">
               <a:rPr lang="en-US" smtClean="0"/>
-              <a:t>4/1/2022</a:t>
+              <a:t>9/26/2022</a:t>
             </a:fld>
             <a:endParaRPr lang="en-US"/>
           </a:p>
@@ -3705,8 +3704,8 @@
         </p:nvSpPr>
         <p:spPr>
           <a:xfrm>
-            <a:off x="1143000" y="718344"/>
-            <a:ext cx="6858000" cy="5421312"/>
+            <a:off x="342900" y="388620"/>
+            <a:ext cx="8397240" cy="6294120"/>
           </a:xfrm>
         </p:spPr>
         <p:txBody>
@@ -3716,52 +3715,58 @@
           <a:lstStyle/>
           <a:p>
             <a:r>
-              <a:rPr lang="en-US" dirty="0">
+              <a:rPr lang="en-US" sz="6900" dirty="0">
                 <a:latin typeface="Roboto Light" panose="02000000000000000000" pitchFamily="2" charset="0"/>
                 <a:ea typeface="Roboto Light" panose="02000000000000000000" pitchFamily="2" charset="0"/>
               </a:rPr>
               <a:t>Python programming for scientists</a:t>
             </a:r>
             <a:br>
-              <a:rPr lang="en-US" dirty="0">
+              <a:rPr lang="en-US" sz="6900" dirty="0">
                 <a:latin typeface="Roboto Light" panose="02000000000000000000" pitchFamily="2" charset="0"/>
                 <a:ea typeface="Roboto Light" panose="02000000000000000000" pitchFamily="2" charset="0"/>
               </a:rPr>
             </a:br>
             <a:r>
-              <a:rPr lang="en-US" dirty="0">
+              <a:rPr lang="en-US" sz="6900" dirty="0">
                 <a:latin typeface="Roboto Light" panose="02000000000000000000" pitchFamily="2" charset="0"/>
                 <a:ea typeface="Roboto Light" panose="02000000000000000000" pitchFamily="2" charset="0"/>
               </a:rPr>
               <a:t>(Group 8)</a:t>
             </a:r>
             <a:br>
-              <a:rPr lang="en-US" dirty="0">
+              <a:rPr lang="en-US" sz="6900" dirty="0">
                 <a:latin typeface="Roboto Light" panose="02000000000000000000" pitchFamily="2" charset="0"/>
                 <a:ea typeface="Roboto Light" panose="02000000000000000000" pitchFamily="2" charset="0"/>
               </a:rPr>
             </a:br>
             <a:br>
-              <a:rPr lang="en-US" dirty="0">
+              <a:rPr lang="en-US" sz="6900" dirty="0">
                 <a:latin typeface="Roboto Light" panose="02000000000000000000" pitchFamily="2" charset="0"/>
                 <a:ea typeface="Roboto Light" panose="02000000000000000000" pitchFamily="2" charset="0"/>
               </a:rPr>
             </a:br>
             <a:br>
-              <a:rPr lang="en-US" dirty="0">
+              <a:rPr lang="en-US" sz="6900" dirty="0">
                 <a:latin typeface="Roboto Light" panose="02000000000000000000" pitchFamily="2" charset="0"/>
                 <a:ea typeface="Roboto Light" panose="02000000000000000000" pitchFamily="2" charset="0"/>
               </a:rPr>
             </a:br>
-            <a:r>
-              <a:rPr lang="en-US" dirty="0">
+            <a:br>
+              <a:rPr lang="en-US" sz="6900" dirty="0">
+                <a:latin typeface="Roboto Light" panose="02000000000000000000" pitchFamily="2" charset="0"/>
+                <a:ea typeface="Roboto Light" panose="02000000000000000000" pitchFamily="2" charset="0"/>
+              </a:rPr>
+            </a:br>
+            <a:r>
+              <a:rPr lang="en-US" sz="6900" dirty="0">
                 <a:latin typeface="Roboto Light" panose="02000000000000000000" pitchFamily="2" charset="0"/>
                 <a:ea typeface="Roboto Light" panose="02000000000000000000" pitchFamily="2" charset="0"/>
               </a:rPr>
               <a:t>Dylan Nelson</a:t>
             </a:r>
             <a:br>
-              <a:rPr lang="en-US" dirty="0">
+              <a:rPr lang="en-US" sz="6900" dirty="0">
                 <a:latin typeface="Roboto Light" panose="02000000000000000000" pitchFamily="2" charset="0"/>
                 <a:ea typeface="Roboto Light" panose="02000000000000000000" pitchFamily="2" charset="0"/>
               </a:rPr>
@@ -3772,6 +3777,47 @@
                 <a:ea typeface="Roboto Light" panose="02000000000000000000" pitchFamily="2" charset="0"/>
               </a:rPr>
               <a:t>dnelson@uni-heidelberg.de</a:t>
+            </a:r>
+          </a:p>
+        </p:txBody>
+      </p:sp>
+      <p:sp>
+        <p:nvSpPr>
+          <p:cNvPr id="3" name="Rectangle 2">
+            <a:extLst>
+              <a:ext uri="{FF2B5EF4-FFF2-40B4-BE49-F238E27FC236}">
+                <a16:creationId xmlns:a16="http://schemas.microsoft.com/office/drawing/2014/main" id="{19D5221D-A8E0-4A3A-9B18-83E168B77D35}"/>
+              </a:ext>
+            </a:extLst>
+          </p:cNvPr>
+          <p:cNvSpPr/>
+          <p:nvPr/>
+        </p:nvSpPr>
+        <p:spPr>
+          <a:xfrm>
+            <a:off x="220980" y="3429000"/>
+            <a:ext cx="8702040" cy="707886"/>
+          </a:xfrm>
+          <a:prstGeom prst="rect">
+            <a:avLst/>
+          </a:prstGeom>
+        </p:spPr>
+        <p:txBody>
+          <a:bodyPr wrap="square">
+            <a:spAutoFit/>
+          </a:bodyPr>
+          <a:lstStyle/>
+          <a:p>
+            <a:pPr algn="ctr"/>
+            <a:r>
+              <a:rPr lang="en-US" sz="4000" dirty="0">
+                <a:solidFill>
+                  <a:schemeClr val="accent5"/>
+                </a:solidFill>
+                <a:latin typeface="Roboto Light" panose="02000000000000000000" pitchFamily="2" charset="0"/>
+                <a:ea typeface="Roboto Light" panose="02000000000000000000" pitchFamily="2" charset="0"/>
+              </a:rPr>
+              <a:t>https://jupyter2.kip.uni-heidelberg.de</a:t>
             </a:r>
           </a:p>
         </p:txBody>
@@ -3780,317 +3826,6 @@
     <p:extLst>
       <p:ext uri="{BB962C8B-B14F-4D97-AF65-F5344CB8AC3E}">
         <p14:creationId xmlns:p14="http://schemas.microsoft.com/office/powerpoint/2010/main" val="2893191513"/>
-      </p:ext>
-    </p:extLst>
-  </p:cSld>
-  <p:clrMapOvr>
-    <a:masterClrMapping/>
-  </p:clrMapOvr>
-</p:sld>
-</file>
-
-<file path=ppt/slides/slide10.xml><?xml version="1.0" encoding="utf-8"?>
-<p:sld xmlns:a="http://schemas.openxmlformats.org/drawingml/2006/main" xmlns:r="http://schemas.openxmlformats.org/officeDocument/2006/relationships" xmlns:p="http://schemas.openxmlformats.org/presentationml/2006/main">
-  <p:cSld>
-    <p:spTree>
-      <p:nvGrpSpPr>
-        <p:cNvPr id="1" name=""/>
-        <p:cNvGrpSpPr/>
-        <p:nvPr/>
-      </p:nvGrpSpPr>
-      <p:grpSpPr>
-        <a:xfrm>
-          <a:off x="0" y="0"/>
-          <a:ext cx="0" cy="0"/>
-          <a:chOff x="0" y="0"/>
-          <a:chExt cx="0" cy="0"/>
-        </a:xfrm>
-      </p:grpSpPr>
-      <p:sp>
-        <p:nvSpPr>
-          <p:cNvPr id="2" name="Title 1">
-            <a:extLst>
-              <a:ext uri="{FF2B5EF4-FFF2-40B4-BE49-F238E27FC236}">
-                <a16:creationId xmlns:a16="http://schemas.microsoft.com/office/drawing/2014/main" id="{56069C82-A8C3-4615-8F2D-CB7EA20ABC58}"/>
-              </a:ext>
-            </a:extLst>
-          </p:cNvPr>
-          <p:cNvSpPr>
-            <a:spLocks noGrp="1"/>
-          </p:cNvSpPr>
-          <p:nvPr>
-            <p:ph type="ctrTitle"/>
-          </p:nvPr>
-        </p:nvSpPr>
-        <p:spPr>
-          <a:xfrm>
-            <a:off x="1143000" y="343695"/>
-            <a:ext cx="6858000" cy="849312"/>
-          </a:xfrm>
-        </p:spPr>
-        <p:txBody>
-          <a:bodyPr>
-            <a:normAutofit fontScale="90000"/>
-          </a:bodyPr>
-          <a:lstStyle/>
-          <a:p>
-            <a:r>
-              <a:rPr lang="en-US" dirty="0">
-                <a:latin typeface="Roboto Light" panose="02000000000000000000" pitchFamily="2" charset="0"/>
-                <a:ea typeface="Roboto Light" panose="02000000000000000000" pitchFamily="2" charset="0"/>
-              </a:rPr>
-              <a:t>Getting set up</a:t>
-            </a:r>
-          </a:p>
-        </p:txBody>
-      </p:sp>
-      <p:sp>
-        <p:nvSpPr>
-          <p:cNvPr id="5" name="TextBox 4">
-            <a:extLst>
-              <a:ext uri="{FF2B5EF4-FFF2-40B4-BE49-F238E27FC236}">
-                <a16:creationId xmlns:a16="http://schemas.microsoft.com/office/drawing/2014/main" id="{531D3185-BD8C-407E-981B-F61B09BEA404}"/>
-              </a:ext>
-            </a:extLst>
-          </p:cNvPr>
-          <p:cNvSpPr txBox="1"/>
-          <p:nvPr/>
-        </p:nvSpPr>
-        <p:spPr>
-          <a:xfrm>
-            <a:off x="228599" y="1271588"/>
-            <a:ext cx="8686801" cy="5386090"/>
-          </a:xfrm>
-          <a:prstGeom prst="rect">
-            <a:avLst/>
-          </a:prstGeom>
-          <a:noFill/>
-        </p:spPr>
-        <p:txBody>
-          <a:bodyPr wrap="square" rtlCol="0">
-            <a:spAutoFit/>
-          </a:bodyPr>
-          <a:lstStyle/>
-          <a:p>
-            <a:pPr marL="285750" indent="-285750">
-              <a:buFont typeface="Arial" panose="020B0604020202020204" pitchFamily="34" charset="0"/>
-              <a:buChar char="•"/>
-            </a:pPr>
-            <a:r>
-              <a:rPr lang="en-US" dirty="0">
-                <a:latin typeface="Roboto Light" panose="02000000000000000000" pitchFamily="2" charset="0"/>
-                <a:ea typeface="Roboto Light" panose="02000000000000000000" pitchFamily="2" charset="0"/>
-              </a:rPr>
-              <a:t>You can use your own laptop if you wish, or a computer in the CIP Pool.</a:t>
-            </a:r>
-          </a:p>
-          <a:p>
-            <a:pPr marL="285750" indent="-285750">
-              <a:buFont typeface="Arial" panose="020B0604020202020204" pitchFamily="34" charset="0"/>
-              <a:buChar char="•"/>
-            </a:pPr>
-            <a:r>
-              <a:rPr lang="en-US" dirty="0">
-                <a:latin typeface="Roboto Light" panose="02000000000000000000" pitchFamily="2" charset="0"/>
-                <a:ea typeface="Roboto Light" panose="02000000000000000000" pitchFamily="2" charset="0"/>
-              </a:rPr>
-              <a:t>Regardless, I suggest everyone use the </a:t>
-            </a:r>
-            <a:r>
-              <a:rPr lang="en-US" dirty="0" err="1">
-                <a:latin typeface="Roboto Light" panose="02000000000000000000" pitchFamily="2" charset="0"/>
-                <a:ea typeface="Roboto Light" panose="02000000000000000000" pitchFamily="2" charset="0"/>
-              </a:rPr>
-              <a:t>JupyterLab</a:t>
-            </a:r>
-            <a:r>
-              <a:rPr lang="en-US" dirty="0">
-                <a:latin typeface="Roboto Light" panose="02000000000000000000" pitchFamily="2" charset="0"/>
-                <a:ea typeface="Roboto Light" panose="02000000000000000000" pitchFamily="2" charset="0"/>
-              </a:rPr>
-              <a:t> service of KIP:</a:t>
-            </a:r>
-          </a:p>
-          <a:p>
-            <a:pPr marL="285750" indent="-285750">
-              <a:buFont typeface="Arial" panose="020B0604020202020204" pitchFamily="34" charset="0"/>
-              <a:buChar char="•"/>
-            </a:pPr>
-            <a:endParaRPr lang="en-US" dirty="0">
-              <a:latin typeface="Roboto Light" panose="02000000000000000000" pitchFamily="2" charset="0"/>
-              <a:ea typeface="Roboto Light" panose="02000000000000000000" pitchFamily="2" charset="0"/>
-            </a:endParaRPr>
-          </a:p>
-          <a:p>
-            <a:pPr algn="ctr"/>
-            <a:r>
-              <a:rPr lang="en-US" sz="2800" dirty="0">
-                <a:solidFill>
-                  <a:schemeClr val="accent5"/>
-                </a:solidFill>
-                <a:latin typeface="Roboto Light" panose="02000000000000000000" pitchFamily="2" charset="0"/>
-                <a:ea typeface="Roboto Light" panose="02000000000000000000" pitchFamily="2" charset="0"/>
-              </a:rPr>
-              <a:t>https://jupyter2.kip.uni-heidelberg.de</a:t>
-            </a:r>
-          </a:p>
-          <a:p>
-            <a:pPr marL="285750" indent="-285750">
-              <a:buFont typeface="Arial" panose="020B0604020202020204" pitchFamily="34" charset="0"/>
-              <a:buChar char="•"/>
-            </a:pPr>
-            <a:endParaRPr lang="en-US" dirty="0">
-              <a:latin typeface="Roboto Light" panose="02000000000000000000" pitchFamily="2" charset="0"/>
-              <a:ea typeface="Roboto Light" panose="02000000000000000000" pitchFamily="2" charset="0"/>
-            </a:endParaRPr>
-          </a:p>
-          <a:p>
-            <a:pPr marL="285750" indent="-285750">
-              <a:buFont typeface="Arial" panose="020B0604020202020204" pitchFamily="34" charset="0"/>
-              <a:buChar char="•"/>
-            </a:pPr>
-            <a:r>
-              <a:rPr lang="en-US" dirty="0">
-                <a:latin typeface="Roboto Light" panose="02000000000000000000" pitchFamily="2" charset="0"/>
-                <a:ea typeface="Roboto Light" panose="02000000000000000000" pitchFamily="2" charset="0"/>
-              </a:rPr>
-              <a:t>You must log in with your student ID and password.</a:t>
-            </a:r>
-          </a:p>
-          <a:p>
-            <a:pPr marL="285750" indent="-285750">
-              <a:buFont typeface="Arial" panose="020B0604020202020204" pitchFamily="34" charset="0"/>
-              <a:buChar char="•"/>
-            </a:pPr>
-            <a:r>
-              <a:rPr lang="en-US" dirty="0">
-                <a:latin typeface="Roboto Light" panose="02000000000000000000" pitchFamily="2" charset="0"/>
-                <a:ea typeface="Roboto Light" panose="02000000000000000000" pitchFamily="2" charset="0"/>
-              </a:rPr>
-              <a:t>This lets you run Python remotely on the server, no need to configure things.</a:t>
-            </a:r>
-          </a:p>
-          <a:p>
-            <a:pPr marL="285750" indent="-285750">
-              <a:buFont typeface="Arial" panose="020B0604020202020204" pitchFamily="34" charset="0"/>
-              <a:buChar char="•"/>
-            </a:pPr>
-            <a:r>
-              <a:rPr lang="en-US" dirty="0">
-                <a:latin typeface="Roboto Light" panose="02000000000000000000" pitchFamily="2" charset="0"/>
-                <a:ea typeface="Roboto Light" panose="02000000000000000000" pitchFamily="2" charset="0"/>
-              </a:rPr>
-              <a:t>If you want to run Python on your own laptop instead, that’s ok, but I can’t help.</a:t>
-            </a:r>
-          </a:p>
-          <a:p>
-            <a:pPr marL="285750" indent="-285750">
-              <a:buFont typeface="Arial" panose="020B0604020202020204" pitchFamily="34" charset="0"/>
-              <a:buChar char="•"/>
-            </a:pPr>
-            <a:endParaRPr lang="en-US" dirty="0">
-              <a:latin typeface="Roboto Light" panose="02000000000000000000" pitchFamily="2" charset="0"/>
-              <a:ea typeface="Roboto Light" panose="02000000000000000000" pitchFamily="2" charset="0"/>
-            </a:endParaRPr>
-          </a:p>
-          <a:p>
-            <a:r>
-              <a:rPr lang="en-US" dirty="0">
-                <a:latin typeface="Roboto Light" panose="02000000000000000000" pitchFamily="2" charset="0"/>
-                <a:ea typeface="Roboto Light" panose="02000000000000000000" pitchFamily="2" charset="0"/>
-              </a:rPr>
-              <a:t>Once you connect, you can download all the course materials by running the following command (in a terminal, in the KIP Lab):</a:t>
-            </a:r>
-          </a:p>
-          <a:p>
-            <a:endParaRPr lang="en-US" dirty="0">
-              <a:latin typeface="Roboto Light" panose="02000000000000000000" pitchFamily="2" charset="0"/>
-              <a:ea typeface="Roboto Light" panose="02000000000000000000" pitchFamily="2" charset="0"/>
-            </a:endParaRPr>
-          </a:p>
-          <a:p>
-            <a:pPr algn="ctr"/>
-            <a:r>
-              <a:rPr lang="en-US" sz="2400">
-                <a:solidFill>
-                  <a:schemeClr val="accent2"/>
-                </a:solidFill>
-                <a:latin typeface="Roboto Light" panose="02000000000000000000" pitchFamily="2" charset="0"/>
-                <a:ea typeface="Roboto Light" panose="02000000000000000000" pitchFamily="2" charset="0"/>
-              </a:rPr>
-              <a:t>git clone </a:t>
-            </a:r>
-            <a:r>
-              <a:rPr lang="en-US" sz="2400" dirty="0">
-                <a:solidFill>
-                  <a:schemeClr val="accent2"/>
-                </a:solidFill>
-                <a:latin typeface="Roboto Light" panose="02000000000000000000" pitchFamily="2" charset="0"/>
-                <a:ea typeface="Roboto Light" panose="02000000000000000000" pitchFamily="2" charset="0"/>
-              </a:rPr>
-              <a:t>https://github.com/nelson-group/pycourse.git</a:t>
-            </a:r>
-          </a:p>
-          <a:p>
-            <a:pPr algn="ctr"/>
-            <a:endParaRPr lang="en-US" sz="2400" dirty="0">
-              <a:solidFill>
-                <a:schemeClr val="accent2"/>
-              </a:solidFill>
-              <a:latin typeface="Roboto Light" panose="02000000000000000000" pitchFamily="2" charset="0"/>
-              <a:ea typeface="Roboto Light" panose="02000000000000000000" pitchFamily="2" charset="0"/>
-            </a:endParaRPr>
-          </a:p>
-          <a:p>
-            <a:r>
-              <a:rPr lang="en-US" dirty="0">
-                <a:latin typeface="Roboto Light" panose="02000000000000000000" pitchFamily="2" charset="0"/>
-                <a:ea typeface="Roboto Light" panose="02000000000000000000" pitchFamily="2" charset="0"/>
-              </a:rPr>
-              <a:t>All the course materials are available at: </a:t>
-            </a:r>
-          </a:p>
-          <a:p>
-            <a:endParaRPr lang="en-US" sz="800" dirty="0">
-              <a:latin typeface="Roboto Light" panose="02000000000000000000" pitchFamily="2" charset="0"/>
-              <a:ea typeface="Roboto Light" panose="02000000000000000000" pitchFamily="2" charset="0"/>
-            </a:endParaRPr>
-          </a:p>
-          <a:p>
-            <a:r>
-              <a:rPr lang="en-US" dirty="0">
-                <a:solidFill>
-                  <a:schemeClr val="bg1">
-                    <a:lumMod val="65000"/>
-                  </a:schemeClr>
-                </a:solidFill>
-                <a:latin typeface="Roboto Light" panose="02000000000000000000" pitchFamily="2" charset="0"/>
-                <a:ea typeface="Roboto Light" panose="02000000000000000000" pitchFamily="2" charset="0"/>
-              </a:rPr>
-              <a:t>www.github.com/nelson-group/pycourse </a:t>
-            </a:r>
-          </a:p>
-          <a:p>
-            <a:endParaRPr lang="en-US" sz="800" dirty="0">
-              <a:latin typeface="Roboto Light" panose="02000000000000000000" pitchFamily="2" charset="0"/>
-              <a:ea typeface="Roboto Light" panose="02000000000000000000" pitchFamily="2" charset="0"/>
-            </a:endParaRPr>
-          </a:p>
-          <a:p>
-            <a:r>
-              <a:rPr lang="en-US" dirty="0">
-                <a:latin typeface="Roboto Light" panose="02000000000000000000" pitchFamily="2" charset="0"/>
-                <a:ea typeface="Roboto Light" panose="02000000000000000000" pitchFamily="2" charset="0"/>
-              </a:rPr>
-              <a:t>including the lectures, the problem sets, and all the associated data files.</a:t>
-            </a:r>
-          </a:p>
-        </p:txBody>
-      </p:sp>
-    </p:spTree>
-    <p:extLst>
-      <p:ext uri="{BB962C8B-B14F-4D97-AF65-F5344CB8AC3E}">
-        <p14:creationId xmlns:p14="http://schemas.microsoft.com/office/powerpoint/2010/main" val="3667037049"/>
       </p:ext>
     </p:extLst>
   </p:cSld>
@@ -4704,80 +4439,12 @@
           </a:prstGeom>
         </p:spPr>
       </p:pic>
-    </p:spTree>
-    <p:extLst>
-      <p:ext uri="{BB962C8B-B14F-4D97-AF65-F5344CB8AC3E}">
-        <p14:creationId xmlns:p14="http://schemas.microsoft.com/office/powerpoint/2010/main" val="1036469819"/>
-      </p:ext>
-    </p:extLst>
-  </p:cSld>
-  <p:clrMapOvr>
-    <a:masterClrMapping/>
-  </p:clrMapOvr>
-</p:sld>
-</file>
-
-<file path=ppt/slides/slide5.xml><?xml version="1.0" encoding="utf-8"?>
-<p:sld xmlns:a="http://schemas.openxmlformats.org/drawingml/2006/main" xmlns:r="http://schemas.openxmlformats.org/officeDocument/2006/relationships" xmlns:p="http://schemas.openxmlformats.org/presentationml/2006/main">
-  <p:cSld>
-    <p:spTree>
-      <p:nvGrpSpPr>
-        <p:cNvPr id="1" name=""/>
-        <p:cNvGrpSpPr/>
-        <p:nvPr/>
-      </p:nvGrpSpPr>
-      <p:grpSpPr>
-        <a:xfrm>
-          <a:off x="0" y="0"/>
-          <a:ext cx="0" cy="0"/>
-          <a:chOff x="0" y="0"/>
-          <a:chExt cx="0" cy="0"/>
-        </a:xfrm>
-      </p:grpSpPr>
-      <p:sp>
-        <p:nvSpPr>
-          <p:cNvPr id="2" name="Title 1">
-            <a:extLst>
-              <a:ext uri="{FF2B5EF4-FFF2-40B4-BE49-F238E27FC236}">
-                <a16:creationId xmlns:a16="http://schemas.microsoft.com/office/drawing/2014/main" id="{56069C82-A8C3-4615-8F2D-CB7EA20ABC58}"/>
-              </a:ext>
-            </a:extLst>
-          </p:cNvPr>
-          <p:cNvSpPr>
-            <a:spLocks noGrp="1"/>
-          </p:cNvSpPr>
-          <p:nvPr>
-            <p:ph type="ctrTitle"/>
-          </p:nvPr>
-        </p:nvSpPr>
-        <p:spPr>
-          <a:xfrm>
-            <a:off x="1143000" y="107951"/>
-            <a:ext cx="6858000" cy="1120774"/>
-          </a:xfrm>
-        </p:spPr>
-        <p:txBody>
-          <a:bodyPr>
-            <a:normAutofit/>
-          </a:bodyPr>
-          <a:lstStyle/>
-          <a:p>
-            <a:r>
-              <a:rPr lang="en-US" dirty="0">
-                <a:latin typeface="Roboto Light" panose="02000000000000000000" pitchFamily="2" charset="0"/>
-                <a:ea typeface="Roboto Light" panose="02000000000000000000" pitchFamily="2" charset="0"/>
-              </a:rPr>
-              <a:t>Python is awesome</a:t>
-            </a:r>
-          </a:p>
-        </p:txBody>
-      </p:sp>
       <p:pic>
         <p:nvPicPr>
-          <p:cNvPr id="6" name="Picture 5">
-            <a:extLst>
-              <a:ext uri="{FF2B5EF4-FFF2-40B4-BE49-F238E27FC236}">
-                <a16:creationId xmlns:a16="http://schemas.microsoft.com/office/drawing/2014/main" id="{E7D42ADF-FB52-4AB0-909B-E1E6582E78F9}"/>
+          <p:cNvPr id="5" name="Picture 4">
+            <a:extLst>
+              <a:ext uri="{FF2B5EF4-FFF2-40B4-BE49-F238E27FC236}">
+                <a16:creationId xmlns:a16="http://schemas.microsoft.com/office/drawing/2014/main" id="{F2C6402B-8B19-49EC-B3C5-51A386BD9C84}"/>
               </a:ext>
             </a:extLst>
           </p:cNvPr>
@@ -4787,7 +4454,7 @@
           <p:nvPr/>
         </p:nvPicPr>
         <p:blipFill>
-          <a:blip r:embed="rId2">
+          <a:blip r:embed="rId3">
             <a:extLst>
               <a:ext uri="{28A0092B-C50C-407E-A947-70E740481C1C}">
                 <a14:useLocalDpi xmlns:a14="http://schemas.microsoft.com/office/drawing/2010/main" val="0"/>
@@ -4800,43 +4467,7 @@
         </p:blipFill>
         <p:spPr>
           <a:xfrm>
-            <a:off x="0" y="1426927"/>
-            <a:ext cx="9144000" cy="5142834"/>
-          </a:xfrm>
-          <a:prstGeom prst="rect">
-            <a:avLst/>
-          </a:prstGeom>
-        </p:spPr>
-      </p:pic>
-      <p:pic>
-        <p:nvPicPr>
-          <p:cNvPr id="7" name="Picture 6">
-            <a:extLst>
-              <a:ext uri="{FF2B5EF4-FFF2-40B4-BE49-F238E27FC236}">
-                <a16:creationId xmlns:a16="http://schemas.microsoft.com/office/drawing/2014/main" id="{12EF09F3-81EC-4AD7-83A2-8C33F6187C9A}"/>
-              </a:ext>
-            </a:extLst>
-          </p:cNvPr>
-          <p:cNvPicPr>
-            <a:picLocks noChangeAspect="1"/>
-          </p:cNvPicPr>
-          <p:nvPr/>
-        </p:nvPicPr>
-        <p:blipFill>
-          <a:blip r:embed="rId3">
-            <a:extLst>
-              <a:ext uri="{28A0092B-C50C-407E-A947-70E740481C1C}">
-                <a14:useLocalDpi xmlns:a14="http://schemas.microsoft.com/office/drawing/2010/main" val="0"/>
-              </a:ext>
-            </a:extLst>
-          </a:blip>
-          <a:stretch>
-            <a:fillRect/>
-          </a:stretch>
-        </p:blipFill>
-        <p:spPr>
-          <a:xfrm>
-            <a:off x="0" y="3330621"/>
+            <a:off x="0" y="3429000"/>
             <a:ext cx="9144000" cy="2491383"/>
           </a:xfrm>
           <a:prstGeom prst="rect">
@@ -4854,7 +4485,7 @@
     </p:spTree>
     <p:extLst>
       <p:ext uri="{BB962C8B-B14F-4D97-AF65-F5344CB8AC3E}">
-        <p14:creationId xmlns:p14="http://schemas.microsoft.com/office/powerpoint/2010/main" val="4150584166"/>
+        <p14:creationId xmlns:p14="http://schemas.microsoft.com/office/powerpoint/2010/main" val="1036469819"/>
       </p:ext>
     </p:extLst>
   </p:cSld>
@@ -4895,7 +4526,7 @@
                                           </p:stCondLst>
                                         </p:cTn>
                                         <p:tgtEl>
-                                          <p:spTgt spid="7"/>
+                                          <p:spTgt spid="5"/>
                                         </p:tgtEl>
                                         <p:attrNameLst>
                                           <p:attrName>style.visibility</p:attrName>
@@ -4939,7 +4570,7 @@
 </p:sld>
 </file>
 
-<file path=ppt/slides/slide6.xml><?xml version="1.0" encoding="utf-8"?>
+<file path=ppt/slides/slide5.xml><?xml version="1.0" encoding="utf-8"?>
 <p:sld xmlns:a="http://schemas.openxmlformats.org/drawingml/2006/main" xmlns:r="http://schemas.openxmlformats.org/officeDocument/2006/relationships" xmlns:p="http://schemas.openxmlformats.org/presentationml/2006/main">
   <p:cSld>
     <p:spTree>
@@ -5256,7 +4887,7 @@
 </p:sld>
 </file>
 
-<file path=ppt/slides/slide7.xml><?xml version="1.0" encoding="utf-8"?>
+<file path=ppt/slides/slide6.xml><?xml version="1.0" encoding="utf-8"?>
 <p:sld xmlns:a="http://schemas.openxmlformats.org/drawingml/2006/main" xmlns:r="http://schemas.openxmlformats.org/officeDocument/2006/relationships" xmlns:p="http://schemas.openxmlformats.org/presentationml/2006/main">
   <p:cSld>
     <p:spTree>
@@ -5325,8 +4956,8 @@
         </p:nvSpPr>
         <p:spPr>
           <a:xfrm>
-            <a:off x="292893" y="978694"/>
-            <a:ext cx="8686801" cy="5632311"/>
+            <a:off x="228598" y="628174"/>
+            <a:ext cx="8686801" cy="6232475"/>
           </a:xfrm>
           <a:prstGeom prst="rect">
             <a:avLst/>
@@ -5344,7 +4975,7 @@
               <a:buChar char="•"/>
             </a:pPr>
             <a:r>
-              <a:rPr lang="en-US" dirty="0">
+              <a:rPr lang="en-US" sz="2100" b="1" dirty="0">
                 <a:latin typeface="Roboto Light" panose="02000000000000000000" pitchFamily="2" charset="0"/>
                 <a:ea typeface="Roboto Light" panose="02000000000000000000" pitchFamily="2" charset="0"/>
               </a:rPr>
@@ -5357,48 +4988,48 @@
               <a:buChar char="•"/>
             </a:pPr>
             <a:r>
-              <a:rPr lang="en-US" dirty="0">
+              <a:rPr lang="en-US" sz="2100" dirty="0">
                 <a:latin typeface="Roboto Light" panose="02000000000000000000" pitchFamily="2" charset="0"/>
                 <a:ea typeface="Roboto Light" panose="02000000000000000000" pitchFamily="2" charset="0"/>
               </a:rPr>
               <a:t>Getting started: </a:t>
             </a:r>
             <a:r>
-              <a:rPr lang="en-US" dirty="0" err="1">
+              <a:rPr lang="en-US" sz="2100" dirty="0" err="1">
                 <a:latin typeface="Roboto Light" panose="02000000000000000000" pitchFamily="2" charset="0"/>
                 <a:ea typeface="Roboto Light" panose="02000000000000000000" pitchFamily="2" charset="0"/>
               </a:rPr>
               <a:t>IPython</a:t>
             </a:r>
             <a:r>
-              <a:rPr lang="en-US" dirty="0">
+              <a:rPr lang="en-US" sz="2100" dirty="0">
                 <a:latin typeface="Roboto Light" panose="02000000000000000000" pitchFamily="2" charset="0"/>
                 <a:ea typeface="Roboto Light" panose="02000000000000000000" pitchFamily="2" charset="0"/>
               </a:rPr>
               <a:t>, scripts vs. </a:t>
             </a:r>
             <a:r>
-              <a:rPr lang="en-US" dirty="0" err="1">
+              <a:rPr lang="en-US" sz="2100" dirty="0" err="1">
                 <a:latin typeface="Roboto Light" panose="02000000000000000000" pitchFamily="2" charset="0"/>
                 <a:ea typeface="Roboto Light" panose="02000000000000000000" pitchFamily="2" charset="0"/>
               </a:rPr>
               <a:t>Jupyter</a:t>
             </a:r>
             <a:r>
-              <a:rPr lang="en-US" dirty="0">
+              <a:rPr lang="en-US" sz="2100" dirty="0">
                 <a:latin typeface="Roboto Light" panose="02000000000000000000" pitchFamily="2" charset="0"/>
                 <a:ea typeface="Roboto Light" panose="02000000000000000000" pitchFamily="2" charset="0"/>
               </a:rPr>
               <a:t> notebooks, </a:t>
             </a:r>
             <a:r>
-              <a:rPr lang="en-US" dirty="0" err="1">
+              <a:rPr lang="en-US" sz="2100" dirty="0" err="1">
                 <a:latin typeface="Roboto Light" panose="02000000000000000000" pitchFamily="2" charset="0"/>
                 <a:ea typeface="Roboto Light" panose="02000000000000000000" pitchFamily="2" charset="0"/>
               </a:rPr>
               <a:t>JupyterLab</a:t>
             </a:r>
-            <a:endParaRPr lang="en-US" dirty="0">
+            <a:endParaRPr lang="en-US" sz="2100" dirty="0">
               <a:latin typeface="Roboto Light" panose="02000000000000000000" pitchFamily="2" charset="0"/>
               <a:ea typeface="Roboto Light" panose="02000000000000000000" pitchFamily="2" charset="0"/>
             </a:endParaRPr>
@@ -5409,7 +5040,7 @@
               <a:buChar char="•"/>
             </a:pPr>
             <a:r>
-              <a:rPr lang="en-US" dirty="0">
+              <a:rPr lang="en-US" sz="2100" dirty="0">
                 <a:latin typeface="Roboto Light" panose="02000000000000000000" pitchFamily="2" charset="0"/>
                 <a:ea typeface="Roboto Light" panose="02000000000000000000" pitchFamily="2" charset="0"/>
               </a:rPr>
@@ -5422,7 +5053,7 @@
               <a:buChar char="•"/>
             </a:pPr>
             <a:r>
-              <a:rPr lang="en-US" dirty="0">
+              <a:rPr lang="en-US" sz="2100" dirty="0">
                 <a:latin typeface="Roboto Light" panose="02000000000000000000" pitchFamily="2" charset="0"/>
                 <a:ea typeface="Roboto Light" panose="02000000000000000000" pitchFamily="2" charset="0"/>
               </a:rPr>
@@ -5435,7 +5066,7 @@
               <a:buChar char="•"/>
             </a:pPr>
             <a:r>
-              <a:rPr lang="en-US" dirty="0">
+              <a:rPr lang="en-US" sz="2100" dirty="0">
                 <a:latin typeface="Roboto Light" panose="02000000000000000000" pitchFamily="2" charset="0"/>
                 <a:ea typeface="Roboto Light" panose="02000000000000000000" pitchFamily="2" charset="0"/>
               </a:rPr>
@@ -5448,7 +5079,7 @@
               <a:buChar char="•"/>
             </a:pPr>
             <a:r>
-              <a:rPr lang="en-US" dirty="0">
+              <a:rPr lang="en-US" sz="2100" b="1" dirty="0">
                 <a:latin typeface="Roboto Light" panose="02000000000000000000" pitchFamily="2" charset="0"/>
                 <a:ea typeface="Roboto Light" panose="02000000000000000000" pitchFamily="2" charset="0"/>
               </a:rPr>
@@ -5461,7 +5092,7 @@
               <a:buChar char="•"/>
             </a:pPr>
             <a:r>
-              <a:rPr lang="en-US" dirty="0">
+              <a:rPr lang="en-US" sz="2100" dirty="0">
                 <a:latin typeface="Roboto Light" panose="02000000000000000000" pitchFamily="2" charset="0"/>
                 <a:ea typeface="Roboto Light" panose="02000000000000000000" pitchFamily="2" charset="0"/>
               </a:rPr>
@@ -5474,7 +5105,7 @@
               <a:buChar char="•"/>
             </a:pPr>
             <a:r>
-              <a:rPr lang="en-US" dirty="0">
+              <a:rPr lang="en-US" sz="2100" dirty="0">
                 <a:latin typeface="Roboto Light" panose="02000000000000000000" pitchFamily="2" charset="0"/>
                 <a:ea typeface="Roboto Light" panose="02000000000000000000" pitchFamily="2" charset="0"/>
               </a:rPr>
@@ -5487,11 +5118,24 @@
               <a:buChar char="•"/>
             </a:pPr>
             <a:r>
-              <a:rPr lang="en-US" dirty="0">
-                <a:latin typeface="Roboto Light" panose="02000000000000000000" pitchFamily="2" charset="0"/>
-                <a:ea typeface="Roboto Light" panose="02000000000000000000" pitchFamily="2" charset="0"/>
-              </a:rPr>
-              <a:t>Python modules</a:t>
+              <a:rPr lang="en-US" sz="2100" dirty="0">
+                <a:latin typeface="Roboto Light" panose="02000000000000000000" pitchFamily="2" charset="0"/>
+                <a:ea typeface="Roboto Light" panose="02000000000000000000" pitchFamily="2" charset="0"/>
+              </a:rPr>
+              <a:t>Python modules, the python “standard library”</a:t>
+            </a:r>
+          </a:p>
+          <a:p>
+            <a:pPr marL="285750" indent="-285750">
+              <a:buFont typeface="Arial" panose="020B0604020202020204" pitchFamily="34" charset="0"/>
+              <a:buChar char="•"/>
+            </a:pPr>
+            <a:r>
+              <a:rPr lang="en-US" sz="2100" b="1" dirty="0">
+                <a:latin typeface="Roboto Light" panose="02000000000000000000" pitchFamily="2" charset="0"/>
+                <a:ea typeface="Roboto Light" panose="02000000000000000000" pitchFamily="2" charset="0"/>
+              </a:rPr>
+              <a:t>Day 3</a:t>
             </a:r>
           </a:p>
           <a:p>
@@ -5500,11 +5144,28 @@
               <a:buChar char="•"/>
             </a:pPr>
             <a:r>
-              <a:rPr lang="en-US" dirty="0">
-                <a:latin typeface="Roboto Light" panose="02000000000000000000" pitchFamily="2" charset="0"/>
-                <a:ea typeface="Roboto Light" panose="02000000000000000000" pitchFamily="2" charset="0"/>
-              </a:rPr>
-              <a:t>The python “standard library”</a:t>
+              <a:rPr lang="en-US" sz="2100" dirty="0" err="1">
+                <a:latin typeface="Roboto Light" panose="02000000000000000000" pitchFamily="2" charset="0"/>
+                <a:ea typeface="Roboto Light" panose="02000000000000000000" pitchFamily="2" charset="0"/>
+              </a:rPr>
+              <a:t>numpy</a:t>
+            </a:r>
+            <a:endParaRPr lang="en-US" sz="2100" dirty="0">
+              <a:latin typeface="Roboto Light" panose="02000000000000000000" pitchFamily="2" charset="0"/>
+              <a:ea typeface="Roboto Light" panose="02000000000000000000" pitchFamily="2" charset="0"/>
+            </a:endParaRPr>
+          </a:p>
+          <a:p>
+            <a:pPr marL="742950" lvl="1" indent="-285750">
+              <a:buFont typeface="Arial" panose="020B0604020202020204" pitchFamily="34" charset="0"/>
+              <a:buChar char="•"/>
+            </a:pPr>
+            <a:r>
+              <a:rPr lang="en-US" sz="2100" dirty="0">
+                <a:latin typeface="Roboto Light" panose="02000000000000000000" pitchFamily="2" charset="0"/>
+                <a:ea typeface="Roboto Light" panose="02000000000000000000" pitchFamily="2" charset="0"/>
+              </a:rPr>
+              <a:t>Matplotlib</a:t>
             </a:r>
           </a:p>
           <a:p>
@@ -5513,11 +5174,11 @@
               <a:buChar char="•"/>
             </a:pPr>
             <a:r>
-              <a:rPr lang="en-US" dirty="0">
-                <a:latin typeface="Roboto Light" panose="02000000000000000000" pitchFamily="2" charset="0"/>
-                <a:ea typeface="Roboto Light" panose="02000000000000000000" pitchFamily="2" charset="0"/>
-              </a:rPr>
-              <a:t>Day 3</a:t>
+              <a:rPr lang="en-US" sz="2100" b="1" dirty="0">
+                <a:latin typeface="Roboto Light" panose="02000000000000000000" pitchFamily="2" charset="0"/>
+                <a:ea typeface="Roboto Light" panose="02000000000000000000" pitchFamily="2" charset="0"/>
+              </a:rPr>
+              <a:t>Day 4</a:t>
             </a:r>
           </a:p>
           <a:p>
@@ -5526,16 +5187,12 @@
               <a:buChar char="•"/>
             </a:pPr>
             <a:r>
-              <a:rPr lang="en-US" dirty="0" err="1">
-                <a:latin typeface="Roboto Light" panose="02000000000000000000" pitchFamily="2" charset="0"/>
-                <a:ea typeface="Roboto Light" panose="02000000000000000000" pitchFamily="2" charset="0"/>
-              </a:rPr>
-              <a:t>numpy</a:t>
-            </a:r>
-            <a:endParaRPr lang="en-US" dirty="0">
-              <a:latin typeface="Roboto Light" panose="02000000000000000000" pitchFamily="2" charset="0"/>
-              <a:ea typeface="Roboto Light" panose="02000000000000000000" pitchFamily="2" charset="0"/>
-            </a:endParaRPr>
+              <a:rPr lang="en-US" sz="2100" dirty="0">
+                <a:latin typeface="Roboto Light" panose="02000000000000000000" pitchFamily="2" charset="0"/>
+                <a:ea typeface="Roboto Light" panose="02000000000000000000" pitchFamily="2" charset="0"/>
+              </a:rPr>
+              <a:t>Classes, object-oriented programming, decorators</a:t>
+            </a:r>
           </a:p>
           <a:p>
             <a:pPr marL="742950" lvl="1" indent="-285750">
@@ -5543,11 +5200,31 @@
               <a:buChar char="•"/>
             </a:pPr>
             <a:r>
-              <a:rPr lang="en-US" dirty="0">
-                <a:latin typeface="Roboto Light" panose="02000000000000000000" pitchFamily="2" charset="0"/>
-                <a:ea typeface="Roboto Light" panose="02000000000000000000" pitchFamily="2" charset="0"/>
-              </a:rPr>
-              <a:t>Matplotlib – add 3d</a:t>
+              <a:rPr lang="en-US" sz="2100" dirty="0">
+                <a:latin typeface="Roboto Light" panose="02000000000000000000" pitchFamily="2" charset="0"/>
+                <a:ea typeface="Roboto Light" panose="02000000000000000000" pitchFamily="2" charset="0"/>
+              </a:rPr>
+              <a:t>Installing packages, error handling, debugging</a:t>
+            </a:r>
+          </a:p>
+          <a:p>
+            <a:pPr marL="742950" lvl="1" indent="-285750">
+              <a:buFont typeface="Arial" panose="020B0604020202020204" pitchFamily="34" charset="0"/>
+              <a:buChar char="•"/>
+            </a:pPr>
+            <a:r>
+              <a:rPr lang="en-US" sz="2100" dirty="0" err="1">
+                <a:latin typeface="Roboto Light" panose="02000000000000000000" pitchFamily="2" charset="0"/>
+                <a:ea typeface="Roboto Light" panose="02000000000000000000" pitchFamily="2" charset="0"/>
+              </a:rPr>
+              <a:t>Scipy</a:t>
+            </a:r>
+            <a:r>
+              <a:rPr lang="en-US" sz="2100" dirty="0">
+                <a:latin typeface="Roboto Light" panose="02000000000000000000" pitchFamily="2" charset="0"/>
+                <a:ea typeface="Roboto Light" panose="02000000000000000000" pitchFamily="2" charset="0"/>
+              </a:rPr>
+              <a:t>: interpolation, integration, fitting</a:t>
             </a:r>
           </a:p>
           <a:p>
@@ -5556,11 +5233,11 @@
               <a:buChar char="•"/>
             </a:pPr>
             <a:r>
-              <a:rPr lang="en-US" dirty="0">
-                <a:latin typeface="Roboto Light" panose="02000000000000000000" pitchFamily="2" charset="0"/>
-                <a:ea typeface="Roboto Light" panose="02000000000000000000" pitchFamily="2" charset="0"/>
-              </a:rPr>
-              <a:t>Day 4</a:t>
+              <a:rPr lang="en-US" sz="2100" b="1" dirty="0">
+                <a:latin typeface="Roboto Light" panose="02000000000000000000" pitchFamily="2" charset="0"/>
+                <a:ea typeface="Roboto Light" panose="02000000000000000000" pitchFamily="2" charset="0"/>
+              </a:rPr>
+              <a:t>Day 5</a:t>
             </a:r>
           </a:p>
           <a:p>
@@ -5569,11 +5246,11 @@
               <a:buChar char="•"/>
             </a:pPr>
             <a:r>
-              <a:rPr lang="en-US" dirty="0">
-                <a:latin typeface="Roboto Light" panose="02000000000000000000" pitchFamily="2" charset="0"/>
-                <a:ea typeface="Roboto Light" panose="02000000000000000000" pitchFamily="2" charset="0"/>
-              </a:rPr>
-              <a:t>Classes, object-oriented programming, decorators - slower</a:t>
+              <a:rPr lang="en-US" sz="2100" dirty="0">
+                <a:latin typeface="Roboto Light" panose="02000000000000000000" pitchFamily="2" charset="0"/>
+                <a:ea typeface="Roboto Light" panose="02000000000000000000" pitchFamily="2" charset="0"/>
+              </a:rPr>
+              <a:t>Parallel programming: threading, multiprocessing</a:t>
             </a:r>
           </a:p>
           <a:p>
@@ -5582,91 +5259,21 @@
               <a:buChar char="•"/>
             </a:pPr>
             <a:r>
-              <a:rPr lang="en-US" dirty="0">
-                <a:latin typeface="Roboto Light" panose="02000000000000000000" pitchFamily="2" charset="0"/>
-                <a:ea typeface="Roboto Light" panose="02000000000000000000" pitchFamily="2" charset="0"/>
-              </a:rPr>
-              <a:t>Installing packages, error handling, debugging</a:t>
-            </a:r>
-          </a:p>
-          <a:p>
-            <a:pPr marL="742950" lvl="1" indent="-285750">
-              <a:buFont typeface="Arial" panose="020B0604020202020204" pitchFamily="34" charset="0"/>
-              <a:buChar char="•"/>
-            </a:pPr>
-            <a:r>
-              <a:rPr lang="en-US" dirty="0" err="1">
-                <a:latin typeface="Roboto Light" panose="02000000000000000000" pitchFamily="2" charset="0"/>
-                <a:ea typeface="Roboto Light" panose="02000000000000000000" pitchFamily="2" charset="0"/>
-              </a:rPr>
-              <a:t>Scipy</a:t>
-            </a:r>
-            <a:r>
-              <a:rPr lang="en-US" dirty="0">
-                <a:latin typeface="Roboto Light" panose="02000000000000000000" pitchFamily="2" charset="0"/>
-                <a:ea typeface="Roboto Light" panose="02000000000000000000" pitchFamily="2" charset="0"/>
-              </a:rPr>
-              <a:t>: interpolation, integration, fitting</a:t>
-            </a:r>
-          </a:p>
-          <a:p>
-            <a:pPr marL="285750" indent="-285750">
-              <a:buFont typeface="Arial" panose="020B0604020202020204" pitchFamily="34" charset="0"/>
-              <a:buChar char="•"/>
-            </a:pPr>
-            <a:r>
-              <a:rPr lang="en-US" dirty="0">
-                <a:latin typeface="Roboto Light" panose="02000000000000000000" pitchFamily="2" charset="0"/>
-                <a:ea typeface="Roboto Light" panose="02000000000000000000" pitchFamily="2" charset="0"/>
-              </a:rPr>
-              <a:t>Day 5</a:t>
-            </a:r>
-          </a:p>
-          <a:p>
-            <a:pPr marL="742950" lvl="1" indent="-285750">
-              <a:buFont typeface="Arial" panose="020B0604020202020204" pitchFamily="34" charset="0"/>
-              <a:buChar char="•"/>
-            </a:pPr>
-            <a:r>
-              <a:rPr lang="en-US" dirty="0">
-                <a:latin typeface="Roboto Light" panose="02000000000000000000" pitchFamily="2" charset="0"/>
-                <a:ea typeface="Roboto Light" panose="02000000000000000000" pitchFamily="2" charset="0"/>
-              </a:rPr>
-              <a:t>Parallel programming: threading, multiprocessing (slower </a:t>
-            </a:r>
-            <a:r>
-              <a:rPr lang="en-US">
-                <a:latin typeface="Roboto Light" panose="02000000000000000000" pitchFamily="2" charset="0"/>
-                <a:ea typeface="Roboto Light" panose="02000000000000000000" pitchFamily="2" charset="0"/>
-              </a:rPr>
-              <a:t>if possible)</a:t>
-            </a:r>
-            <a:endParaRPr lang="en-US" dirty="0">
-              <a:latin typeface="Roboto Light" panose="02000000000000000000" pitchFamily="2" charset="0"/>
-              <a:ea typeface="Roboto Light" panose="02000000000000000000" pitchFamily="2" charset="0"/>
-            </a:endParaRPr>
-          </a:p>
-          <a:p>
-            <a:pPr marL="742950" lvl="1" indent="-285750">
-              <a:buFont typeface="Arial" panose="020B0604020202020204" pitchFamily="34" charset="0"/>
-              <a:buChar char="•"/>
-            </a:pPr>
-            <a:r>
-              <a:rPr lang="en-US" dirty="0">
+              <a:rPr lang="en-US" sz="2100" dirty="0">
                 <a:latin typeface="Roboto Light" panose="02000000000000000000" pitchFamily="2" charset="0"/>
                 <a:ea typeface="Roboto Light" panose="02000000000000000000" pitchFamily="2" charset="0"/>
               </a:rPr>
               <a:t>Making it go fast: </a:t>
             </a:r>
             <a:r>
-              <a:rPr lang="en-US" dirty="0" err="1">
+              <a:rPr lang="en-US" sz="2100" dirty="0" err="1">
                 <a:latin typeface="Roboto Light" panose="02000000000000000000" pitchFamily="2" charset="0"/>
                 <a:ea typeface="Roboto Light" panose="02000000000000000000" pitchFamily="2" charset="0"/>
               </a:rPr>
               <a:t>numba</a:t>
             </a:r>
             <a:r>
-              <a:rPr lang="en-US" dirty="0">
+              <a:rPr lang="en-US" sz="2100" dirty="0">
                 <a:latin typeface="Roboto Light" panose="02000000000000000000" pitchFamily="2" charset="0"/>
                 <a:ea typeface="Roboto Light" panose="02000000000000000000" pitchFamily="2" charset="0"/>
               </a:rPr>
@@ -6002,15 +5609,33 @@
                                   </p:childTnLst>
                                 </p:cTn>
                               </p:par>
+                            </p:childTnLst>
+                          </p:cTn>
+                        </p:par>
+                      </p:childTnLst>
+                    </p:cTn>
+                  </p:par>
+                  <p:par>
+                    <p:cTn id="25" fill="hold">
+                      <p:stCondLst>
+                        <p:cond delay="indefinite"/>
+                      </p:stCondLst>
+                      <p:childTnLst>
+                        <p:par>
+                          <p:cTn id="26" fill="hold">
+                            <p:stCondLst>
+                              <p:cond delay="0"/>
+                            </p:stCondLst>
+                            <p:childTnLst>
                               <p:par>
-                                <p:cTn id="25" presetID="1" presetClass="entr" presetSubtype="0" fill="hold" grpId="0" nodeType="withEffect">
+                                <p:cTn id="27" presetID="1" presetClass="entr" presetSubtype="0" fill="hold" grpId="0" nodeType="clickEffect">
                                   <p:stCondLst>
                                     <p:cond delay="0"/>
                                   </p:stCondLst>
                                   <p:childTnLst>
                                     <p:set>
                                       <p:cBhvr>
-                                        <p:cTn id="26" dur="1" fill="hold">
+                                        <p:cTn id="28" dur="1" fill="hold">
                                           <p:stCondLst>
                                             <p:cond delay="0"/>
                                           </p:stCondLst>
@@ -6033,26 +5658,8 @@
                                   </p:childTnLst>
                                 </p:cTn>
                               </p:par>
-                            </p:childTnLst>
-                          </p:cTn>
-                        </p:par>
-                      </p:childTnLst>
-                    </p:cTn>
-                  </p:par>
-                  <p:par>
-                    <p:cTn id="27" fill="hold">
-                      <p:stCondLst>
-                        <p:cond delay="indefinite"/>
-                      </p:stCondLst>
-                      <p:childTnLst>
-                        <p:par>
-                          <p:cTn id="28" fill="hold">
-                            <p:stCondLst>
-                              <p:cond delay="0"/>
-                            </p:stCondLst>
-                            <p:childTnLst>
                               <p:par>
-                                <p:cTn id="29" presetID="1" presetClass="entr" presetSubtype="0" fill="hold" grpId="0" nodeType="clickEffect">
+                                <p:cTn id="29" presetID="1" presetClass="entr" presetSubtype="0" fill="hold" grpId="0" nodeType="withEffect">
                                   <p:stCondLst>
                                     <p:cond delay="0"/>
                                   </p:stCondLst>
@@ -6113,15 +5720,33 @@
                                   </p:childTnLst>
                                 </p:cTn>
                               </p:par>
+                            </p:childTnLst>
+                          </p:cTn>
+                        </p:par>
+                      </p:childTnLst>
+                    </p:cTn>
+                  </p:par>
+                  <p:par>
+                    <p:cTn id="33" fill="hold">
+                      <p:stCondLst>
+                        <p:cond delay="indefinite"/>
+                      </p:stCondLst>
+                      <p:childTnLst>
+                        <p:par>
+                          <p:cTn id="34" fill="hold">
+                            <p:stCondLst>
+                              <p:cond delay="0"/>
+                            </p:stCondLst>
+                            <p:childTnLst>
                               <p:par>
-                                <p:cTn id="33" presetID="1" presetClass="entr" presetSubtype="0" fill="hold" grpId="0" nodeType="withEffect">
+                                <p:cTn id="35" presetID="1" presetClass="entr" presetSubtype="0" fill="hold" grpId="0" nodeType="clickEffect">
                                   <p:stCondLst>
                                     <p:cond delay="0"/>
                                   </p:stCondLst>
                                   <p:childTnLst>
                                     <p:set>
                                       <p:cBhvr>
-                                        <p:cTn id="34" dur="1" fill="hold">
+                                        <p:cTn id="36" dur="1" fill="hold">
                                           <p:stCondLst>
                                             <p:cond delay="0"/>
                                           </p:stCondLst>
@@ -6144,26 +5769,8 @@
                                   </p:childTnLst>
                                 </p:cTn>
                               </p:par>
-                            </p:childTnLst>
-                          </p:cTn>
-                        </p:par>
-                      </p:childTnLst>
-                    </p:cTn>
-                  </p:par>
-                  <p:par>
-                    <p:cTn id="35" fill="hold">
-                      <p:stCondLst>
-                        <p:cond delay="indefinite"/>
-                      </p:stCondLst>
-                      <p:childTnLst>
-                        <p:par>
-                          <p:cTn id="36" fill="hold">
-                            <p:stCondLst>
-                              <p:cond delay="0"/>
-                            </p:stCondLst>
-                            <p:childTnLst>
                               <p:par>
-                                <p:cTn id="37" presetID="1" presetClass="entr" presetSubtype="0" fill="hold" grpId="0" nodeType="clickEffect">
+                                <p:cTn id="37" presetID="1" presetClass="entr" presetSubtype="0" fill="hold" grpId="0" nodeType="withEffect">
                                   <p:stCondLst>
                                     <p:cond delay="0"/>
                                   </p:stCondLst>
@@ -6255,15 +5862,33 @@
                                   </p:childTnLst>
                                 </p:cTn>
                               </p:par>
+                            </p:childTnLst>
+                          </p:cTn>
+                        </p:par>
+                      </p:childTnLst>
+                    </p:cTn>
+                  </p:par>
+                  <p:par>
+                    <p:cTn id="43" fill="hold">
+                      <p:stCondLst>
+                        <p:cond delay="indefinite"/>
+                      </p:stCondLst>
+                      <p:childTnLst>
+                        <p:par>
+                          <p:cTn id="44" fill="hold">
+                            <p:stCondLst>
+                              <p:cond delay="0"/>
+                            </p:stCondLst>
+                            <p:childTnLst>
                               <p:par>
-                                <p:cTn id="43" presetID="1" presetClass="entr" presetSubtype="0" fill="hold" grpId="0" nodeType="withEffect">
+                                <p:cTn id="45" presetID="1" presetClass="entr" presetSubtype="0" fill="hold" grpId="0" nodeType="clickEffect">
                                   <p:stCondLst>
                                     <p:cond delay="0"/>
                                   </p:stCondLst>
                                   <p:childTnLst>
                                     <p:set>
                                       <p:cBhvr>
-                                        <p:cTn id="44" dur="1" fill="hold">
+                                        <p:cTn id="46" dur="1" fill="hold">
                                           <p:stCondLst>
                                             <p:cond delay="0"/>
                                           </p:stCondLst>
@@ -6286,26 +5911,8 @@
                                   </p:childTnLst>
                                 </p:cTn>
                               </p:par>
-                            </p:childTnLst>
-                          </p:cTn>
-                        </p:par>
-                      </p:childTnLst>
-                    </p:cTn>
-                  </p:par>
-                  <p:par>
-                    <p:cTn id="45" fill="hold">
-                      <p:stCondLst>
-                        <p:cond delay="indefinite"/>
-                      </p:stCondLst>
-                      <p:childTnLst>
-                        <p:par>
-                          <p:cTn id="46" fill="hold">
-                            <p:stCondLst>
-                              <p:cond delay="0"/>
-                            </p:stCondLst>
-                            <p:childTnLst>
                               <p:par>
-                                <p:cTn id="47" presetID="1" presetClass="entr" presetSubtype="0" fill="hold" grpId="0" nodeType="clickEffect">
+                                <p:cTn id="47" presetID="1" presetClass="entr" presetSubtype="0" fill="hold" grpId="0" nodeType="withEffect">
                                   <p:stCondLst>
                                     <p:cond delay="0"/>
                                   </p:stCondLst>
@@ -6366,37 +5973,6 @@
                                   </p:childTnLst>
                                 </p:cTn>
                               </p:par>
-                              <p:par>
-                                <p:cTn id="51" presetID="1" presetClass="entr" presetSubtype="0" fill="hold" grpId="0" nodeType="withEffect">
-                                  <p:stCondLst>
-                                    <p:cond delay="0"/>
-                                  </p:stCondLst>
-                                  <p:childTnLst>
-                                    <p:set>
-                                      <p:cBhvr>
-                                        <p:cTn id="52" dur="1" fill="hold">
-                                          <p:stCondLst>
-                                            <p:cond delay="0"/>
-                                          </p:stCondLst>
-                                        </p:cTn>
-                                        <p:tgtEl>
-                                          <p:spTgt spid="3">
-                                            <p:txEl>
-                                              <p:pRg st="19" end="19"/>
-                                            </p:txEl>
-                                          </p:spTgt>
-                                        </p:tgtEl>
-                                        <p:attrNameLst>
-                                          <p:attrName>style.visibility</p:attrName>
-                                        </p:attrNameLst>
-                                      </p:cBhvr>
-                                      <p:to>
-                                        <p:strVal val="visible"/>
-                                      </p:to>
-                                    </p:set>
-                                  </p:childTnLst>
-                                </p:cTn>
-                              </p:par>
                             </p:childTnLst>
                           </p:cTn>
                         </p:par>
@@ -6431,7 +6007,7 @@
 </p:sld>
 </file>
 
-<file path=ppt/slides/slide8.xml><?xml version="1.0" encoding="utf-8"?>
+<file path=ppt/slides/slide7.xml><?xml version="1.0" encoding="utf-8"?>
 <p:sld xmlns:a="http://schemas.openxmlformats.org/drawingml/2006/main" xmlns:r="http://schemas.openxmlformats.org/officeDocument/2006/relationships" xmlns:p="http://schemas.openxmlformats.org/presentationml/2006/main">
   <p:cSld>
     <p:spTree>
@@ -6501,7 +6077,7 @@
         <p:spPr>
           <a:xfrm>
             <a:off x="228599" y="1271588"/>
-            <a:ext cx="8686801" cy="2585323"/>
+            <a:ext cx="8686801" cy="3000821"/>
           </a:xfrm>
           <a:prstGeom prst="rect">
             <a:avLst/>
@@ -6515,7 +6091,7 @@
           <a:lstStyle/>
           <a:p>
             <a:r>
-              <a:rPr lang="en-US" dirty="0">
+              <a:rPr lang="en-US" sz="2100" dirty="0">
                 <a:latin typeface="Roboto Light" panose="02000000000000000000" pitchFamily="2" charset="0"/>
                 <a:ea typeface="Roboto Light" panose="02000000000000000000" pitchFamily="2" charset="0"/>
               </a:rPr>
@@ -6528,7 +6104,7 @@
               <a:buChar char="•"/>
             </a:pPr>
             <a:r>
-              <a:rPr lang="en-US" dirty="0">
+              <a:rPr lang="en-US" sz="2100" dirty="0">
                 <a:latin typeface="Roboto Light" panose="02000000000000000000" pitchFamily="2" charset="0"/>
                 <a:ea typeface="Roboto Light" panose="02000000000000000000" pitchFamily="2" charset="0"/>
               </a:rPr>
@@ -6541,7 +6117,7 @@
               <a:buChar char="•"/>
             </a:pPr>
             <a:r>
-              <a:rPr lang="en-US" dirty="0">
+              <a:rPr lang="en-US" sz="2100" dirty="0">
                 <a:latin typeface="Roboto Light" panose="02000000000000000000" pitchFamily="2" charset="0"/>
                 <a:ea typeface="Roboto Light" panose="02000000000000000000" pitchFamily="2" charset="0"/>
               </a:rPr>
@@ -6553,7 +6129,7 @@
               <a:buFont typeface="Arial" panose="020B0604020202020204" pitchFamily="34" charset="0"/>
               <a:buChar char="•"/>
             </a:pPr>
-            <a:endParaRPr lang="en-US" dirty="0">
+            <a:endParaRPr lang="en-US" sz="2100" dirty="0">
               <a:latin typeface="Roboto Light" panose="02000000000000000000" pitchFamily="2" charset="0"/>
               <a:ea typeface="Roboto Light" panose="02000000000000000000" pitchFamily="2" charset="0"/>
             </a:endParaRPr>
@@ -6564,7 +6140,7 @@
               <a:buChar char="§"/>
             </a:pPr>
             <a:r>
-              <a:rPr lang="en-US" dirty="0">
+              <a:rPr lang="en-US" sz="2100" dirty="0">
                 <a:latin typeface="Roboto Light" panose="02000000000000000000" pitchFamily="2" charset="0"/>
                 <a:ea typeface="Roboto Light" panose="02000000000000000000" pitchFamily="2" charset="0"/>
               </a:rPr>
@@ -6577,7 +6153,7 @@
               <a:buChar char="§"/>
             </a:pPr>
             <a:r>
-              <a:rPr lang="en-US" dirty="0">
+              <a:rPr lang="en-US" sz="2100" dirty="0">
                 <a:latin typeface="Roboto Light" panose="02000000000000000000" pitchFamily="2" charset="0"/>
                 <a:ea typeface="Roboto Light" panose="02000000000000000000" pitchFamily="2" charset="0"/>
               </a:rPr>
@@ -6590,7 +6166,7 @@
               <a:buChar char="§"/>
             </a:pPr>
             <a:r>
-              <a:rPr lang="en-US" dirty="0">
+              <a:rPr lang="en-US" sz="2100" dirty="0">
                 <a:latin typeface="Roboto Light" panose="02000000000000000000" pitchFamily="2" charset="0"/>
                 <a:ea typeface="Roboto Light" panose="02000000000000000000" pitchFamily="2" charset="0"/>
               </a:rPr>
@@ -6603,7 +6179,7 @@
               <a:buChar char="§"/>
             </a:pPr>
             <a:r>
-              <a:rPr lang="en-US" dirty="0">
+              <a:rPr lang="en-US" sz="2100" dirty="0">
                 <a:latin typeface="Roboto Light" panose="02000000000000000000" pitchFamily="2" charset="0"/>
                 <a:ea typeface="Roboto Light" panose="02000000000000000000" pitchFamily="2" charset="0"/>
               </a:rPr>
@@ -6616,7 +6192,7 @@
               <a:buChar char="§"/>
             </a:pPr>
             <a:r>
-              <a:rPr lang="en-US" dirty="0">
+              <a:rPr lang="en-US" sz="2100" dirty="0">
                 <a:latin typeface="Roboto Light" panose="02000000000000000000" pitchFamily="2" charset="0"/>
                 <a:ea typeface="Roboto Light" panose="02000000000000000000" pitchFamily="2" charset="0"/>
               </a:rPr>
@@ -6639,8 +6215,8 @@
         </p:nvSpPr>
         <p:spPr>
           <a:xfrm>
-            <a:off x="228599" y="3995678"/>
-            <a:ext cx="8768751" cy="2308324"/>
+            <a:off x="228599" y="4430018"/>
+            <a:ext cx="8768751" cy="2354491"/>
           </a:xfrm>
           <a:prstGeom prst="rect">
             <a:avLst/>
@@ -6653,37 +6229,22 @@
           <a:lstStyle/>
           <a:p>
             <a:r>
-              <a:rPr lang="en-US" dirty="0">
-                <a:latin typeface="Roboto Light" panose="02000000000000000000" pitchFamily="2" charset="0"/>
-                <a:ea typeface="Roboto Light" panose="02000000000000000000" pitchFamily="2" charset="0"/>
-              </a:rPr>
-              <a:t>The course will be in English.</a:t>
-            </a:r>
-          </a:p>
-          <a:p>
-            <a:endParaRPr lang="en-US" dirty="0">
+              <a:rPr lang="en-US" sz="2100" dirty="0">
+                <a:latin typeface="Roboto Light" panose="02000000000000000000" pitchFamily="2" charset="0"/>
+                <a:ea typeface="Roboto Light" panose="02000000000000000000" pitchFamily="2" charset="0"/>
+              </a:rPr>
+              <a:t>During the lectures there are many small exercises mixed in: you won’t be just listening, but also working.</a:t>
+            </a:r>
+          </a:p>
+          <a:p>
+            <a:endParaRPr lang="en-US" sz="2100" dirty="0">
               <a:latin typeface="Roboto Light" panose="02000000000000000000" pitchFamily="2" charset="0"/>
               <a:ea typeface="Roboto Light" panose="02000000000000000000" pitchFamily="2" charset="0"/>
             </a:endParaRPr>
           </a:p>
           <a:p>
             <a:r>
-              <a:rPr lang="en-US" dirty="0">
-                <a:latin typeface="Roboto Light" panose="02000000000000000000" pitchFamily="2" charset="0"/>
-                <a:ea typeface="Roboto Light" panose="02000000000000000000" pitchFamily="2" charset="0"/>
-              </a:rPr>
-              <a:t>During the lectures there are many small exercises mixed in: you won’t be just listening, but also working.</a:t>
-            </a:r>
-          </a:p>
-          <a:p>
-            <a:endParaRPr lang="en-US" dirty="0">
-              <a:latin typeface="Roboto Light" panose="02000000000000000000" pitchFamily="2" charset="0"/>
-              <a:ea typeface="Roboto Light" panose="02000000000000000000" pitchFamily="2" charset="0"/>
-            </a:endParaRPr>
-          </a:p>
-          <a:p>
-            <a:r>
-              <a:rPr lang="en-US" dirty="0">
+              <a:rPr lang="en-US" sz="2100" dirty="0">
                 <a:latin typeface="Roboto Light" panose="02000000000000000000" pitchFamily="2" charset="0"/>
                 <a:ea typeface="Roboto Light" panose="02000000000000000000" pitchFamily="2" charset="0"/>
               </a:rPr>
@@ -6783,7 +6344,7 @@
 </p:sld>
 </file>
 
-<file path=ppt/slides/slide9.xml><?xml version="1.0" encoding="utf-8"?>
+<file path=ppt/slides/slide8.xml><?xml version="1.0" encoding="utf-8"?>
 <p:sld xmlns:a="http://schemas.openxmlformats.org/drawingml/2006/main" xmlns:r="http://schemas.openxmlformats.org/officeDocument/2006/relationships" xmlns:p="http://schemas.openxmlformats.org/presentationml/2006/main">
   <p:cSld>
     <p:spTree>
@@ -6818,7 +6379,7 @@
         </p:nvSpPr>
         <p:spPr>
           <a:xfrm>
-            <a:off x="1143000" y="343695"/>
+            <a:off x="1142999" y="99855"/>
             <a:ext cx="6858000" cy="849312"/>
           </a:xfrm>
         </p:spPr>
@@ -6852,8 +6413,8 @@
         </p:nvSpPr>
         <p:spPr>
           <a:xfrm>
-            <a:off x="228599" y="1271588"/>
-            <a:ext cx="8686801" cy="5078313"/>
+            <a:off x="121918" y="933450"/>
+            <a:ext cx="8915402" cy="5909310"/>
           </a:xfrm>
           <a:prstGeom prst="rect">
             <a:avLst/>
@@ -6871,7 +6432,7 @@
               <a:buChar char="•"/>
             </a:pPr>
             <a:r>
-              <a:rPr lang="en-US" dirty="0">
+              <a:rPr lang="en-US" sz="2100" dirty="0">
                 <a:latin typeface="Roboto Light" panose="02000000000000000000" pitchFamily="2" charset="0"/>
                 <a:ea typeface="Roboto Light" panose="02000000000000000000" pitchFamily="2" charset="0"/>
               </a:rPr>
@@ -6884,11 +6445,40 @@
               <a:buChar char="•"/>
             </a:pPr>
             <a:r>
-              <a:rPr lang="en-US" dirty="0">
-                <a:latin typeface="Roboto Light" panose="02000000000000000000" pitchFamily="2" charset="0"/>
-                <a:ea typeface="Roboto Light" panose="02000000000000000000" pitchFamily="2" charset="0"/>
-              </a:rPr>
-              <a:t>I would expect that you attend afternoons (14-17h) until you’ve finished, or tried, the exercise problems of each day, and can then take off.</a:t>
+              <a:rPr lang="en-US" sz="2100" dirty="0">
+                <a:latin typeface="Roboto Light" panose="02000000000000000000" pitchFamily="2" charset="0"/>
+                <a:ea typeface="Roboto Light" panose="02000000000000000000" pitchFamily="2" charset="0"/>
+              </a:rPr>
+              <a:t>Afternoons (14-17h) are optional, but please use to: try/finish the optional exercises, the </a:t>
+            </a:r>
+            <a:r>
+              <a:rPr lang="en-US" sz="2100" dirty="0" err="1">
+                <a:latin typeface="Roboto Light" panose="02000000000000000000" pitchFamily="2" charset="0"/>
+                <a:ea typeface="Roboto Light" panose="02000000000000000000" pitchFamily="2" charset="0"/>
+              </a:rPr>
+              <a:t>homeworks</a:t>
+            </a:r>
+            <a:r>
+              <a:rPr lang="en-US" sz="2100" dirty="0">
+                <a:latin typeface="Roboto Light" panose="02000000000000000000" pitchFamily="2" charset="0"/>
+                <a:ea typeface="Roboto Light" panose="02000000000000000000" pitchFamily="2" charset="0"/>
+              </a:rPr>
+              <a:t>, work with others, ask questions, etc.</a:t>
+            </a:r>
+          </a:p>
+          <a:p>
+            <a:endParaRPr lang="en-US" sz="2100" dirty="0">
+              <a:latin typeface="Roboto Light" panose="02000000000000000000" pitchFamily="2" charset="0"/>
+              <a:ea typeface="Roboto Light" panose="02000000000000000000" pitchFamily="2" charset="0"/>
+            </a:endParaRPr>
+          </a:p>
+          <a:p>
+            <a:r>
+              <a:rPr lang="en-US" sz="2100" dirty="0">
+                <a:latin typeface="Roboto Light" panose="02000000000000000000" pitchFamily="2" charset="0"/>
+                <a:ea typeface="Roboto Light" panose="02000000000000000000" pitchFamily="2" charset="0"/>
+              </a:rPr>
+              <a:t>3 problem sets</a:t>
             </a:r>
           </a:p>
           <a:p>
@@ -6897,11 +6487,14 @@
               <a:buChar char="•"/>
             </a:pPr>
             <a:r>
-              <a:rPr lang="en-US" dirty="0">
-                <a:latin typeface="Roboto Light" panose="02000000000000000000" pitchFamily="2" charset="0"/>
-                <a:ea typeface="Roboto Light" panose="02000000000000000000" pitchFamily="2" charset="0"/>
-              </a:rPr>
-              <a:t>Can also use this time to simply finish the homework problem sets.</a:t>
+              <a:rPr lang="en-US" sz="2100" dirty="0">
+                <a:solidFill>
+                  <a:schemeClr val="accent2"/>
+                </a:solidFill>
+                <a:latin typeface="Roboto Light" panose="02000000000000000000" pitchFamily="2" charset="0"/>
+                <a:ea typeface="Roboto Light" panose="02000000000000000000" pitchFamily="2" charset="0"/>
+              </a:rPr>
+              <a:t>All 3 problem sets must be submitted to pass the course.</a:t>
             </a:r>
           </a:p>
           <a:p>
@@ -6909,18 +6502,22 @@
               <a:buFont typeface="Arial" panose="020B0604020202020204" pitchFamily="34" charset="0"/>
               <a:buChar char="•"/>
             </a:pPr>
-            <a:endParaRPr lang="en-US" dirty="0">
-              <a:latin typeface="Roboto Light" panose="02000000000000000000" pitchFamily="2" charset="0"/>
-              <a:ea typeface="Roboto Light" panose="02000000000000000000" pitchFamily="2" charset="0"/>
-            </a:endParaRPr>
-          </a:p>
-          <a:p>
-            <a:r>
-              <a:rPr lang="en-US" dirty="0">
-                <a:latin typeface="Roboto Light" panose="02000000000000000000" pitchFamily="2" charset="0"/>
-                <a:ea typeface="Roboto Light" panose="02000000000000000000" pitchFamily="2" charset="0"/>
-              </a:rPr>
-              <a:t>3 problem sets</a:t>
+            <a:r>
+              <a:rPr lang="en-US" sz="2100" dirty="0">
+                <a:solidFill>
+                  <a:schemeClr val="accent2"/>
+                </a:solidFill>
+                <a:latin typeface="Roboto Light" panose="02000000000000000000" pitchFamily="2" charset="0"/>
+                <a:ea typeface="Roboto Light" panose="02000000000000000000" pitchFamily="2" charset="0"/>
+              </a:rPr>
+              <a:t>An average grade of 60% is required </a:t>
+            </a:r>
+            <a:r>
+              <a:rPr lang="en-US" sz="2100" dirty="0">
+                <a:latin typeface="Roboto Light" panose="02000000000000000000" pitchFamily="2" charset="0"/>
+                <a:ea typeface="Roboto Light" panose="02000000000000000000" pitchFamily="2" charset="0"/>
+              </a:rPr>
+              <a:t>(i.e. need to do most, but not all, parts).</a:t>
             </a:r>
           </a:p>
           <a:p>
@@ -6929,14 +6526,11 @@
               <a:buChar char="•"/>
             </a:pPr>
             <a:r>
-              <a:rPr lang="en-US" dirty="0">
-                <a:solidFill>
-                  <a:schemeClr val="accent2"/>
-                </a:solidFill>
-                <a:latin typeface="Roboto Light" panose="02000000000000000000" pitchFamily="2" charset="0"/>
-                <a:ea typeface="Roboto Light" panose="02000000000000000000" pitchFamily="2" charset="0"/>
-              </a:rPr>
-              <a:t>All 3 problem sets must be submitted to pass the course.</a:t>
+              <a:rPr lang="en-US" sz="2100" dirty="0">
+                <a:latin typeface="Roboto Light" panose="02000000000000000000" pitchFamily="2" charset="0"/>
+                <a:ea typeface="Roboto Light" panose="02000000000000000000" pitchFamily="2" charset="0"/>
+              </a:rPr>
+              <a:t>Submit via email.</a:t>
             </a:r>
           </a:p>
           <a:p>
@@ -6945,21 +6539,31 @@
               <a:buChar char="•"/>
             </a:pPr>
             <a:r>
-              <a:rPr lang="en-US" dirty="0">
+              <a:rPr lang="en-US" sz="2100" b="1" dirty="0">
                 <a:solidFill>
                   <a:schemeClr val="accent2"/>
                 </a:solidFill>
                 <a:latin typeface="Roboto Light" panose="02000000000000000000" pitchFamily="2" charset="0"/>
                 <a:ea typeface="Roboto Light" panose="02000000000000000000" pitchFamily="2" charset="0"/>
               </a:rPr>
-              <a:t>An average grade of 60% is required </a:t>
-            </a:r>
-            <a:r>
-              <a:rPr lang="en-US" dirty="0">
-                <a:latin typeface="Roboto Light" panose="02000000000000000000" pitchFamily="2" charset="0"/>
-                <a:ea typeface="Roboto Light" panose="02000000000000000000" pitchFamily="2" charset="0"/>
-              </a:rPr>
-              <a:t>(i.e. need to do most, but not all, parts).</a:t>
+              <a:t>Due date: Friday October 7 @17h</a:t>
+            </a:r>
+            <a:r>
+              <a:rPr lang="en-US" sz="2100" dirty="0">
+                <a:solidFill>
+                  <a:schemeClr val="accent2"/>
+                </a:solidFill>
+                <a:latin typeface="Roboto Light" panose="02000000000000000000" pitchFamily="2" charset="0"/>
+                <a:ea typeface="Roboto Light" panose="02000000000000000000" pitchFamily="2" charset="0"/>
+              </a:rPr>
+              <a:t> </a:t>
+            </a:r>
+            <a:r>
+              <a:rPr lang="en-US" sz="2100" dirty="0">
+                <a:latin typeface="Roboto Light" panose="02000000000000000000" pitchFamily="2" charset="0"/>
+                <a:ea typeface="Roboto Light" panose="02000000000000000000" pitchFamily="2" charset="0"/>
+              </a:rPr>
+              <a:t>(one week after the end of the course).</a:t>
             </a:r>
           </a:p>
           <a:p>
@@ -6967,12 +6571,18 @@
               <a:buFont typeface="Arial" panose="020B0604020202020204" pitchFamily="34" charset="0"/>
               <a:buChar char="•"/>
             </a:pPr>
-            <a:r>
-              <a:rPr lang="en-US" dirty="0">
-                <a:latin typeface="Roboto Light" panose="02000000000000000000" pitchFamily="2" charset="0"/>
-                <a:ea typeface="Roboto Light" panose="02000000000000000000" pitchFamily="2" charset="0"/>
-              </a:rPr>
-              <a:t>Submit via email.</a:t>
+            <a:endParaRPr lang="en-US" sz="2100" dirty="0">
+              <a:latin typeface="Roboto Light" panose="02000000000000000000" pitchFamily="2" charset="0"/>
+              <a:ea typeface="Roboto Light" panose="02000000000000000000" pitchFamily="2" charset="0"/>
+            </a:endParaRPr>
+          </a:p>
+          <a:p>
+            <a:r>
+              <a:rPr lang="en-US" sz="2100" dirty="0">
+                <a:latin typeface="Roboto Light" panose="02000000000000000000" pitchFamily="2" charset="0"/>
+                <a:ea typeface="Roboto Light" panose="02000000000000000000" pitchFamily="2" charset="0"/>
+              </a:rPr>
+              <a:t>Problem set solutions:</a:t>
             </a:r>
           </a:p>
           <a:p>
@@ -6981,51 +6591,39 @@
               <a:buChar char="•"/>
             </a:pPr>
             <a:r>
-              <a:rPr lang="en-US" b="1" dirty="0">
-                <a:solidFill>
-                  <a:schemeClr val="accent2"/>
-                </a:solidFill>
-                <a:latin typeface="Roboto Light" panose="02000000000000000000" pitchFamily="2" charset="0"/>
-                <a:ea typeface="Roboto Light" panose="02000000000000000000" pitchFamily="2" charset="0"/>
-              </a:rPr>
-              <a:t>Due date: Friday </a:t>
-            </a:r>
-            <a:r>
-              <a:rPr lang="en-US" b="1">
-                <a:solidFill>
-                  <a:schemeClr val="accent2"/>
-                </a:solidFill>
-                <a:latin typeface="Roboto Light" panose="02000000000000000000" pitchFamily="2" charset="0"/>
-                <a:ea typeface="Roboto Light" panose="02000000000000000000" pitchFamily="2" charset="0"/>
-              </a:rPr>
-              <a:t>October 7 </a:t>
-            </a:r>
-            <a:r>
-              <a:rPr lang="en-US" b="1" dirty="0">
-                <a:solidFill>
-                  <a:schemeClr val="accent2"/>
-                </a:solidFill>
-                <a:latin typeface="Roboto Light" panose="02000000000000000000" pitchFamily="2" charset="0"/>
-                <a:ea typeface="Roboto Light" panose="02000000000000000000" pitchFamily="2" charset="0"/>
-              </a:rPr>
-              <a:t>@17h</a:t>
-            </a:r>
-            <a:r>
-              <a:rPr lang="en-US" dirty="0">
-                <a:solidFill>
-                  <a:schemeClr val="accent2"/>
-                </a:solidFill>
-                <a:latin typeface="Roboto Light" panose="02000000000000000000" pitchFamily="2" charset="0"/>
-                <a:ea typeface="Roboto Light" panose="02000000000000000000" pitchFamily="2" charset="0"/>
-              </a:rPr>
-              <a:t> </a:t>
-            </a:r>
-            <a:r>
-              <a:rPr lang="en-US" dirty="0">
-                <a:latin typeface="Roboto Light" panose="02000000000000000000" pitchFamily="2" charset="0"/>
-                <a:ea typeface="Roboto Light" panose="02000000000000000000" pitchFamily="2" charset="0"/>
-              </a:rPr>
-              <a:t>(one week after the end of the block course).</a:t>
+              <a:rPr lang="en-US" sz="2100" dirty="0">
+                <a:latin typeface="Roboto Light" panose="02000000000000000000" pitchFamily="2" charset="0"/>
+                <a:ea typeface="Roboto Light" panose="02000000000000000000" pitchFamily="2" charset="0"/>
+              </a:rPr>
+              <a:t>Submit as python scripts (.</a:t>
+            </a:r>
+            <a:r>
+              <a:rPr lang="en-US" sz="2100" dirty="0" err="1">
+                <a:latin typeface="Roboto Light" panose="02000000000000000000" pitchFamily="2" charset="0"/>
+                <a:ea typeface="Roboto Light" panose="02000000000000000000" pitchFamily="2" charset="0"/>
+              </a:rPr>
+              <a:t>py</a:t>
+            </a:r>
+            <a:r>
+              <a:rPr lang="en-US" sz="2100" dirty="0">
+                <a:latin typeface="Roboto Light" panose="02000000000000000000" pitchFamily="2" charset="0"/>
+                <a:ea typeface="Roboto Light" panose="02000000000000000000" pitchFamily="2" charset="0"/>
+              </a:rPr>
+              <a:t>) or </a:t>
+            </a:r>
+            <a:r>
+              <a:rPr lang="en-US" sz="2100" dirty="0" err="1">
+                <a:latin typeface="Roboto Light" panose="02000000000000000000" pitchFamily="2" charset="0"/>
+                <a:ea typeface="Roboto Light" panose="02000000000000000000" pitchFamily="2" charset="0"/>
+              </a:rPr>
+              <a:t>Jupyter</a:t>
+            </a:r>
+            <a:r>
+              <a:rPr lang="en-US" sz="2100" dirty="0">
+                <a:latin typeface="Roboto Light" panose="02000000000000000000" pitchFamily="2" charset="0"/>
+                <a:ea typeface="Roboto Light" panose="02000000000000000000" pitchFamily="2" charset="0"/>
+              </a:rPr>
+              <a:t> notebooks.</a:t>
             </a:r>
           </a:p>
           <a:p>
@@ -7033,18 +6631,12 @@
               <a:buFont typeface="Arial" panose="020B0604020202020204" pitchFamily="34" charset="0"/>
               <a:buChar char="•"/>
             </a:pPr>
-            <a:endParaRPr lang="en-US" dirty="0">
-              <a:latin typeface="Roboto Light" panose="02000000000000000000" pitchFamily="2" charset="0"/>
-              <a:ea typeface="Roboto Light" panose="02000000000000000000" pitchFamily="2" charset="0"/>
-            </a:endParaRPr>
-          </a:p>
-          <a:p>
-            <a:r>
-              <a:rPr lang="en-US" dirty="0">
-                <a:latin typeface="Roboto Light" panose="02000000000000000000" pitchFamily="2" charset="0"/>
-                <a:ea typeface="Roboto Light" panose="02000000000000000000" pitchFamily="2" charset="0"/>
-              </a:rPr>
-              <a:t>Problem set solutions:</a:t>
+            <a:r>
+              <a:rPr lang="en-US" sz="2100" dirty="0">
+                <a:latin typeface="Roboto Light" panose="02000000000000000000" pitchFamily="2" charset="0"/>
+                <a:ea typeface="Roboto Light" panose="02000000000000000000" pitchFamily="2" charset="0"/>
+              </a:rPr>
+              <a:t>Should be clean, documented, understandable. Remove unused code.</a:t>
             </a:r>
           </a:p>
           <a:p>
@@ -7053,39 +6645,11 @@
               <a:buChar char="•"/>
             </a:pPr>
             <a:r>
-              <a:rPr lang="en-US" dirty="0">
-                <a:latin typeface="Roboto Light" panose="02000000000000000000" pitchFamily="2" charset="0"/>
-                <a:ea typeface="Roboto Light" panose="02000000000000000000" pitchFamily="2" charset="0"/>
-              </a:rPr>
-              <a:t>Submit as python scripts (.</a:t>
-            </a:r>
-            <a:r>
-              <a:rPr lang="en-US" dirty="0" err="1">
-                <a:latin typeface="Roboto Light" panose="02000000000000000000" pitchFamily="2" charset="0"/>
-                <a:ea typeface="Roboto Light" panose="02000000000000000000" pitchFamily="2" charset="0"/>
-              </a:rPr>
-              <a:t>py</a:t>
-            </a:r>
-            <a:r>
-              <a:rPr lang="en-US" dirty="0">
-                <a:latin typeface="Roboto Light" panose="02000000000000000000" pitchFamily="2" charset="0"/>
-                <a:ea typeface="Roboto Light" panose="02000000000000000000" pitchFamily="2" charset="0"/>
-              </a:rPr>
-              <a:t>) or </a:t>
-            </a:r>
-            <a:r>
-              <a:rPr lang="en-US" dirty="0" err="1">
-                <a:latin typeface="Roboto Light" panose="02000000000000000000" pitchFamily="2" charset="0"/>
-                <a:ea typeface="Roboto Light" panose="02000000000000000000" pitchFamily="2" charset="0"/>
-              </a:rPr>
-              <a:t>Jupyter</a:t>
-            </a:r>
-            <a:r>
-              <a:rPr lang="en-US" dirty="0">
-                <a:latin typeface="Roboto Light" panose="02000000000000000000" pitchFamily="2" charset="0"/>
-                <a:ea typeface="Roboto Light" panose="02000000000000000000" pitchFamily="2" charset="0"/>
-              </a:rPr>
-              <a:t> notebooks.</a:t>
+              <a:rPr lang="en-US" sz="2100" dirty="0">
+                <a:latin typeface="Roboto Light" panose="02000000000000000000" pitchFamily="2" charset="0"/>
+                <a:ea typeface="Roboto Light" panose="02000000000000000000" pitchFamily="2" charset="0"/>
+              </a:rPr>
+              <a:t>Should run without errors.</a:t>
             </a:r>
           </a:p>
           <a:p>
@@ -7094,11 +6658,11 @@
               <a:buChar char="•"/>
             </a:pPr>
             <a:r>
-              <a:rPr lang="en-US" dirty="0">
-                <a:latin typeface="Roboto Light" panose="02000000000000000000" pitchFamily="2" charset="0"/>
-                <a:ea typeface="Roboto Light" panose="02000000000000000000" pitchFamily="2" charset="0"/>
-              </a:rPr>
-              <a:t>Should be clean, documented, explained, understandable. Remove unused code.</a:t>
+              <a:rPr lang="en-US" sz="2100" dirty="0">
+                <a:latin typeface="Roboto Light" panose="02000000000000000000" pitchFamily="2" charset="0"/>
+                <a:ea typeface="Roboto Light" panose="02000000000000000000" pitchFamily="2" charset="0"/>
+              </a:rPr>
+              <a:t>Keep in mind: there is never a unique solution to a problem, so your approach is likely different than others.</a:t>
             </a:r>
           </a:p>
           <a:p>
@@ -7107,33 +6671,7 @@
               <a:buChar char="•"/>
             </a:pPr>
             <a:r>
-              <a:rPr lang="en-US" dirty="0">
-                <a:latin typeface="Roboto Light" panose="02000000000000000000" pitchFamily="2" charset="0"/>
-                <a:ea typeface="Roboto Light" panose="02000000000000000000" pitchFamily="2" charset="0"/>
-              </a:rPr>
-              <a:t>Should run without errors.</a:t>
-            </a:r>
-          </a:p>
-          <a:p>
-            <a:pPr marL="285750" indent="-285750">
-              <a:buFont typeface="Arial" panose="020B0604020202020204" pitchFamily="34" charset="0"/>
-              <a:buChar char="•"/>
-            </a:pPr>
-            <a:r>
-              <a:rPr lang="en-US" dirty="0">
-                <a:latin typeface="Roboto Light" panose="02000000000000000000" pitchFamily="2" charset="0"/>
-                <a:ea typeface="Roboto Light" panose="02000000000000000000" pitchFamily="2" charset="0"/>
-              </a:rPr>
-              <a:t>Keep in mind: there is never a unique solution to a problem, so your approach is likely different than others.</a:t>
-            </a:r>
-          </a:p>
-          <a:p>
-            <a:pPr marL="285750" indent="-285750">
-              <a:buFont typeface="Arial" panose="020B0604020202020204" pitchFamily="34" charset="0"/>
-              <a:buChar char="•"/>
-            </a:pPr>
-            <a:r>
-              <a:rPr lang="en-US" dirty="0">
+              <a:rPr lang="en-US" sz="2100" dirty="0">
                 <a:latin typeface="Roboto Light" panose="02000000000000000000" pitchFamily="2" charset="0"/>
                 <a:ea typeface="Roboto Light" panose="02000000000000000000" pitchFamily="2" charset="0"/>
               </a:rPr>
@@ -7234,15 +6772,33 @@
                                   </p:childTnLst>
                                 </p:cTn>
                               </p:par>
+                            </p:childTnLst>
+                          </p:cTn>
+                        </p:par>
+                      </p:childTnLst>
+                    </p:cTn>
+                  </p:par>
+                  <p:par>
+                    <p:cTn id="9" fill="hold">
+                      <p:stCondLst>
+                        <p:cond delay="indefinite"/>
+                      </p:stCondLst>
+                      <p:childTnLst>
+                        <p:par>
+                          <p:cTn id="10" fill="hold">
+                            <p:stCondLst>
+                              <p:cond delay="0"/>
+                            </p:stCondLst>
+                            <p:childTnLst>
                               <p:par>
-                                <p:cTn id="9" presetID="1" presetClass="entr" presetSubtype="0" fill="hold" grpId="0" nodeType="withEffect">
+                                <p:cTn id="11" presetID="1" presetClass="entr" presetSubtype="0" fill="hold" grpId="0" nodeType="clickEffect">
                                   <p:stCondLst>
                                     <p:cond delay="0"/>
                                   </p:stCondLst>
                                   <p:childTnLst>
                                     <p:set>
                                       <p:cBhvr>
-                                        <p:cTn id="10" dur="1" fill="hold">
+                                        <p:cTn id="12" dur="1" fill="hold">
                                           <p:stCondLst>
                                             <p:cond delay="0"/>
                                           </p:stCondLst>
@@ -7250,7 +6806,7 @@
                                         <p:tgtEl>
                                           <p:spTgt spid="5">
                                             <p:txEl>
-                                              <p:pRg st="2" end="2"/>
+                                              <p:pRg st="3" end="3"/>
                                             </p:txEl>
                                           </p:spTgt>
                                         </p:tgtEl>
@@ -7265,26 +6821,8 @@
                                   </p:childTnLst>
                                 </p:cTn>
                               </p:par>
-                            </p:childTnLst>
-                          </p:cTn>
-                        </p:par>
-                      </p:childTnLst>
-                    </p:cTn>
-                  </p:par>
-                  <p:par>
-                    <p:cTn id="11" fill="hold">
-                      <p:stCondLst>
-                        <p:cond delay="indefinite"/>
-                      </p:stCondLst>
-                      <p:childTnLst>
-                        <p:par>
-                          <p:cTn id="12" fill="hold">
-                            <p:stCondLst>
-                              <p:cond delay="0"/>
-                            </p:stCondLst>
-                            <p:childTnLst>
                               <p:par>
-                                <p:cTn id="13" presetID="1" presetClass="entr" presetSubtype="0" fill="hold" grpId="0" nodeType="clickEffect">
+                                <p:cTn id="13" presetID="1" presetClass="entr" presetSubtype="0" fill="hold" grpId="0" nodeType="withEffect">
                                   <p:stCondLst>
                                     <p:cond delay="0"/>
                                   </p:stCondLst>
@@ -7407,15 +6945,33 @@
                                   </p:childTnLst>
                                 </p:cTn>
                               </p:par>
+                            </p:childTnLst>
+                          </p:cTn>
+                        </p:par>
+                      </p:childTnLst>
+                    </p:cTn>
+                  </p:par>
+                  <p:par>
+                    <p:cTn id="21" fill="hold">
+                      <p:stCondLst>
+                        <p:cond delay="indefinite"/>
+                      </p:stCondLst>
+                      <p:childTnLst>
+                        <p:par>
+                          <p:cTn id="22" fill="hold">
+                            <p:stCondLst>
+                              <p:cond delay="0"/>
+                            </p:stCondLst>
+                            <p:childTnLst>
                               <p:par>
-                                <p:cTn id="21" presetID="1" presetClass="entr" presetSubtype="0" fill="hold" grpId="0" nodeType="withEffect">
+                                <p:cTn id="23" presetID="1" presetClass="entr" presetSubtype="0" fill="hold" grpId="0" nodeType="clickEffect">
                                   <p:stCondLst>
                                     <p:cond delay="0"/>
                                   </p:stCondLst>
                                   <p:childTnLst>
                                     <p:set>
                                       <p:cBhvr>
-                                        <p:cTn id="22" dur="1" fill="hold">
+                                        <p:cTn id="24" dur="1" fill="hold">
                                           <p:stCondLst>
                                             <p:cond delay="0"/>
                                           </p:stCondLst>
@@ -7423,7 +6979,7 @@
                                         <p:tgtEl>
                                           <p:spTgt spid="5">
                                             <p:txEl>
-                                              <p:pRg st="8" end="8"/>
+                                              <p:pRg st="9" end="9"/>
                                             </p:txEl>
                                           </p:spTgt>
                                         </p:tgtEl>
@@ -7438,26 +6994,8 @@
                                   </p:childTnLst>
                                 </p:cTn>
                               </p:par>
-                            </p:childTnLst>
-                          </p:cTn>
-                        </p:par>
-                      </p:childTnLst>
-                    </p:cTn>
-                  </p:par>
-                  <p:par>
-                    <p:cTn id="23" fill="hold">
-                      <p:stCondLst>
-                        <p:cond delay="indefinite"/>
-                      </p:stCondLst>
-                      <p:childTnLst>
-                        <p:par>
-                          <p:cTn id="24" fill="hold">
-                            <p:stCondLst>
-                              <p:cond delay="0"/>
-                            </p:stCondLst>
-                            <p:childTnLst>
                               <p:par>
-                                <p:cTn id="25" presetID="1" presetClass="entr" presetSubtype="0" fill="hold" grpId="0" nodeType="clickEffect">
+                                <p:cTn id="25" presetID="1" presetClass="entr" presetSubtype="0" fill="hold" grpId="0" nodeType="withEffect">
                                   <p:stCondLst>
                                     <p:cond delay="0"/>
                                   </p:stCondLst>
@@ -7611,37 +7149,6 @@
                                   </p:childTnLst>
                                 </p:cTn>
                               </p:par>
-                              <p:par>
-                                <p:cTn id="35" presetID="1" presetClass="entr" presetSubtype="0" fill="hold" grpId="0" nodeType="withEffect">
-                                  <p:stCondLst>
-                                    <p:cond delay="0"/>
-                                  </p:stCondLst>
-                                  <p:childTnLst>
-                                    <p:set>
-                                      <p:cBhvr>
-                                        <p:cTn id="36" dur="1" fill="hold">
-                                          <p:stCondLst>
-                                            <p:cond delay="0"/>
-                                          </p:stCondLst>
-                                        </p:cTn>
-                                        <p:tgtEl>
-                                          <p:spTgt spid="5">
-                                            <p:txEl>
-                                              <p:pRg st="15" end="15"/>
-                                            </p:txEl>
-                                          </p:spTgt>
-                                        </p:tgtEl>
-                                        <p:attrNameLst>
-                                          <p:attrName>style.visibility</p:attrName>
-                                        </p:attrNameLst>
-                                      </p:cBhvr>
-                                      <p:to>
-                                        <p:strVal val="visible"/>
-                                      </p:to>
-                                    </p:set>
-                                  </p:childTnLst>
-                                </p:cTn>
-                              </p:par>
                             </p:childTnLst>
                           </p:cTn>
                         </p:par>
@@ -7673,6 +7180,307 @@
       <p:bldP spid="5" grpId="0" uiExpand="1" build="p"/>
     </p:bldLst>
   </p:timing>
+</p:sld>
+</file>
+
+<file path=ppt/slides/slide9.xml><?xml version="1.0" encoding="utf-8"?>
+<p:sld xmlns:a="http://schemas.openxmlformats.org/drawingml/2006/main" xmlns:r="http://schemas.openxmlformats.org/officeDocument/2006/relationships" xmlns:p="http://schemas.openxmlformats.org/presentationml/2006/main">
+  <p:cSld>
+    <p:spTree>
+      <p:nvGrpSpPr>
+        <p:cNvPr id="1" name=""/>
+        <p:cNvGrpSpPr/>
+        <p:nvPr/>
+      </p:nvGrpSpPr>
+      <p:grpSpPr>
+        <a:xfrm>
+          <a:off x="0" y="0"/>
+          <a:ext cx="0" cy="0"/>
+          <a:chOff x="0" y="0"/>
+          <a:chExt cx="0" cy="0"/>
+        </a:xfrm>
+      </p:grpSpPr>
+      <p:sp>
+        <p:nvSpPr>
+          <p:cNvPr id="2" name="Title 1">
+            <a:extLst>
+              <a:ext uri="{FF2B5EF4-FFF2-40B4-BE49-F238E27FC236}">
+                <a16:creationId xmlns:a16="http://schemas.microsoft.com/office/drawing/2014/main" id="{56069C82-A8C3-4615-8F2D-CB7EA20ABC58}"/>
+              </a:ext>
+            </a:extLst>
+          </p:cNvPr>
+          <p:cNvSpPr>
+            <a:spLocks noGrp="1"/>
+          </p:cNvSpPr>
+          <p:nvPr>
+            <p:ph type="ctrTitle"/>
+          </p:nvPr>
+        </p:nvSpPr>
+        <p:spPr>
+          <a:xfrm>
+            <a:off x="1143000" y="92235"/>
+            <a:ext cx="6858000" cy="849312"/>
+          </a:xfrm>
+        </p:spPr>
+        <p:txBody>
+          <a:bodyPr>
+            <a:normAutofit fontScale="90000"/>
+          </a:bodyPr>
+          <a:lstStyle/>
+          <a:p>
+            <a:r>
+              <a:rPr lang="en-US" dirty="0">
+                <a:latin typeface="Roboto Light" panose="02000000000000000000" pitchFamily="2" charset="0"/>
+                <a:ea typeface="Roboto Light" panose="02000000000000000000" pitchFamily="2" charset="0"/>
+              </a:rPr>
+              <a:t>Getting set up</a:t>
+            </a:r>
+          </a:p>
+        </p:txBody>
+      </p:sp>
+      <p:sp>
+        <p:nvSpPr>
+          <p:cNvPr id="5" name="TextBox 4">
+            <a:extLst>
+              <a:ext uri="{FF2B5EF4-FFF2-40B4-BE49-F238E27FC236}">
+                <a16:creationId xmlns:a16="http://schemas.microsoft.com/office/drawing/2014/main" id="{531D3185-BD8C-407E-981B-F61B09BEA404}"/>
+              </a:ext>
+            </a:extLst>
+          </p:cNvPr>
+          <p:cNvSpPr txBox="1"/>
+          <p:nvPr/>
+        </p:nvSpPr>
+        <p:spPr>
+          <a:xfrm>
+            <a:off x="228599" y="966788"/>
+            <a:ext cx="8686801" cy="5847755"/>
+          </a:xfrm>
+          <a:prstGeom prst="rect">
+            <a:avLst/>
+          </a:prstGeom>
+          <a:noFill/>
+        </p:spPr>
+        <p:txBody>
+          <a:bodyPr wrap="square" rtlCol="0">
+            <a:spAutoFit/>
+          </a:bodyPr>
+          <a:lstStyle/>
+          <a:p>
+            <a:pPr marL="285750" indent="-285750">
+              <a:buFont typeface="Arial" panose="020B0604020202020204" pitchFamily="34" charset="0"/>
+              <a:buChar char="•"/>
+            </a:pPr>
+            <a:r>
+              <a:rPr lang="en-US" sz="2100" dirty="0">
+                <a:latin typeface="Roboto Light" panose="02000000000000000000" pitchFamily="2" charset="0"/>
+                <a:ea typeface="Roboto Light" panose="02000000000000000000" pitchFamily="2" charset="0"/>
+              </a:rPr>
+              <a:t>You can use your own laptop, or a computer in the CIP Pool.</a:t>
+            </a:r>
+          </a:p>
+          <a:p>
+            <a:pPr marL="285750" indent="-285750">
+              <a:buFont typeface="Arial" panose="020B0604020202020204" pitchFamily="34" charset="0"/>
+              <a:buChar char="•"/>
+            </a:pPr>
+            <a:r>
+              <a:rPr lang="en-US" sz="2100" dirty="0">
+                <a:latin typeface="Roboto Light" panose="02000000000000000000" pitchFamily="2" charset="0"/>
+                <a:ea typeface="Roboto Light" panose="02000000000000000000" pitchFamily="2" charset="0"/>
+              </a:rPr>
+              <a:t>Regardless, I suggest everyone use the </a:t>
+            </a:r>
+            <a:r>
+              <a:rPr lang="en-US" sz="2100" dirty="0" err="1">
+                <a:latin typeface="Roboto Light" panose="02000000000000000000" pitchFamily="2" charset="0"/>
+                <a:ea typeface="Roboto Light" panose="02000000000000000000" pitchFamily="2" charset="0"/>
+              </a:rPr>
+              <a:t>JupyterLab</a:t>
+            </a:r>
+            <a:r>
+              <a:rPr lang="en-US" sz="2100" dirty="0">
+                <a:latin typeface="Roboto Light" panose="02000000000000000000" pitchFamily="2" charset="0"/>
+                <a:ea typeface="Roboto Light" panose="02000000000000000000" pitchFamily="2" charset="0"/>
+              </a:rPr>
+              <a:t> service of KIP:</a:t>
+            </a:r>
+          </a:p>
+          <a:p>
+            <a:pPr marL="285750" indent="-285750">
+              <a:buFont typeface="Arial" panose="020B0604020202020204" pitchFamily="34" charset="0"/>
+              <a:buChar char="•"/>
+            </a:pPr>
+            <a:endParaRPr lang="en-US" dirty="0">
+              <a:latin typeface="Roboto Light" panose="02000000000000000000" pitchFamily="2" charset="0"/>
+              <a:ea typeface="Roboto Light" panose="02000000000000000000" pitchFamily="2" charset="0"/>
+            </a:endParaRPr>
+          </a:p>
+          <a:p>
+            <a:pPr algn="ctr"/>
+            <a:r>
+              <a:rPr lang="en-US" sz="2800" dirty="0">
+                <a:solidFill>
+                  <a:schemeClr val="accent5"/>
+                </a:solidFill>
+                <a:latin typeface="Roboto Light" panose="02000000000000000000" pitchFamily="2" charset="0"/>
+                <a:ea typeface="Roboto Light" panose="02000000000000000000" pitchFamily="2" charset="0"/>
+              </a:rPr>
+              <a:t>https://jupyter2.kip.uni-heidelberg.de</a:t>
+            </a:r>
+          </a:p>
+          <a:p>
+            <a:pPr marL="285750" indent="-285750">
+              <a:buFont typeface="Arial" panose="020B0604020202020204" pitchFamily="34" charset="0"/>
+              <a:buChar char="•"/>
+            </a:pPr>
+            <a:endParaRPr lang="en-US" dirty="0">
+              <a:latin typeface="Roboto Light" panose="02000000000000000000" pitchFamily="2" charset="0"/>
+              <a:ea typeface="Roboto Light" panose="02000000000000000000" pitchFamily="2" charset="0"/>
+            </a:endParaRPr>
+          </a:p>
+          <a:p>
+            <a:pPr marL="285750" indent="-285750">
+              <a:buFont typeface="Arial" panose="020B0604020202020204" pitchFamily="34" charset="0"/>
+              <a:buChar char="•"/>
+            </a:pPr>
+            <a:r>
+              <a:rPr lang="en-US" sz="2100" dirty="0">
+                <a:latin typeface="Roboto Light" panose="02000000000000000000" pitchFamily="2" charset="0"/>
+                <a:ea typeface="Roboto Light" panose="02000000000000000000" pitchFamily="2" charset="0"/>
+              </a:rPr>
+              <a:t>You must log in with your student ID and password.</a:t>
+            </a:r>
+          </a:p>
+          <a:p>
+            <a:pPr marL="285750" indent="-285750">
+              <a:buFont typeface="Arial" panose="020B0604020202020204" pitchFamily="34" charset="0"/>
+              <a:buChar char="•"/>
+            </a:pPr>
+            <a:r>
+              <a:rPr lang="en-US" sz="2100" dirty="0">
+                <a:latin typeface="Roboto Light" panose="02000000000000000000" pitchFamily="2" charset="0"/>
+                <a:ea typeface="Roboto Light" panose="02000000000000000000" pitchFamily="2" charset="0"/>
+              </a:rPr>
+              <a:t>This lets you run Python easily, no need to configure things.</a:t>
+            </a:r>
+          </a:p>
+          <a:p>
+            <a:pPr marL="285750" indent="-285750">
+              <a:buFont typeface="Arial" panose="020B0604020202020204" pitchFamily="34" charset="0"/>
+              <a:buChar char="•"/>
+            </a:pPr>
+            <a:r>
+              <a:rPr lang="en-US" sz="2100" dirty="0">
+                <a:latin typeface="Roboto Light" panose="02000000000000000000" pitchFamily="2" charset="0"/>
+                <a:ea typeface="Roboto Light" panose="02000000000000000000" pitchFamily="2" charset="0"/>
+              </a:rPr>
+              <a:t>If you want to run Python on your own laptop instead, that’s ok.</a:t>
+            </a:r>
+          </a:p>
+          <a:p>
+            <a:pPr marL="285750" indent="-285750">
+              <a:buFont typeface="Arial" panose="020B0604020202020204" pitchFamily="34" charset="0"/>
+              <a:buChar char="•"/>
+            </a:pPr>
+            <a:endParaRPr lang="en-US" dirty="0">
+              <a:latin typeface="Roboto Light" panose="02000000000000000000" pitchFamily="2" charset="0"/>
+              <a:ea typeface="Roboto Light" panose="02000000000000000000" pitchFamily="2" charset="0"/>
+            </a:endParaRPr>
+          </a:p>
+          <a:p>
+            <a:r>
+              <a:rPr lang="en-US" sz="2100" dirty="0">
+                <a:latin typeface="Roboto Light" panose="02000000000000000000" pitchFamily="2" charset="0"/>
+                <a:ea typeface="Roboto Light" panose="02000000000000000000" pitchFamily="2" charset="0"/>
+              </a:rPr>
+              <a:t>Once you connect, you can download all the course materials by running the following command (in a “terminal”, in the KIP Lab):</a:t>
+            </a:r>
+          </a:p>
+          <a:p>
+            <a:endParaRPr lang="en-US" dirty="0">
+              <a:latin typeface="Roboto Light" panose="02000000000000000000" pitchFamily="2" charset="0"/>
+              <a:ea typeface="Roboto Light" panose="02000000000000000000" pitchFamily="2" charset="0"/>
+            </a:endParaRPr>
+          </a:p>
+          <a:p>
+            <a:pPr algn="ctr"/>
+            <a:r>
+              <a:rPr lang="en-US" sz="2400" dirty="0">
+                <a:solidFill>
+                  <a:schemeClr val="accent2"/>
+                </a:solidFill>
+                <a:latin typeface="Roboto Light" panose="02000000000000000000" pitchFamily="2" charset="0"/>
+                <a:ea typeface="Roboto Light" panose="02000000000000000000" pitchFamily="2" charset="0"/>
+              </a:rPr>
+              <a:t>git clone https://github.com/nelson-group/pycourse.git</a:t>
+            </a:r>
+          </a:p>
+          <a:p>
+            <a:pPr algn="ctr"/>
+            <a:endParaRPr lang="en-US" sz="2400" dirty="0">
+              <a:solidFill>
+                <a:schemeClr val="accent2"/>
+              </a:solidFill>
+              <a:latin typeface="Roboto Light" panose="02000000000000000000" pitchFamily="2" charset="0"/>
+              <a:ea typeface="Roboto Light" panose="02000000000000000000" pitchFamily="2" charset="0"/>
+            </a:endParaRPr>
+          </a:p>
+          <a:p>
+            <a:r>
+              <a:rPr lang="en-US" sz="2100" dirty="0">
+                <a:latin typeface="Roboto Light" panose="02000000000000000000" pitchFamily="2" charset="0"/>
+                <a:ea typeface="Roboto Light" panose="02000000000000000000" pitchFamily="2" charset="0"/>
+              </a:rPr>
+              <a:t>All the course materials are available at: </a:t>
+            </a:r>
+          </a:p>
+          <a:p>
+            <a:endParaRPr lang="en-US" sz="800" dirty="0">
+              <a:latin typeface="Roboto Light" panose="02000000000000000000" pitchFamily="2" charset="0"/>
+              <a:ea typeface="Roboto Light" panose="02000000000000000000" pitchFamily="2" charset="0"/>
+            </a:endParaRPr>
+          </a:p>
+          <a:p>
+            <a:r>
+              <a:rPr lang="en-US" sz="2100" dirty="0">
+                <a:solidFill>
+                  <a:schemeClr val="bg1">
+                    <a:lumMod val="65000"/>
+                  </a:schemeClr>
+                </a:solidFill>
+                <a:latin typeface="Roboto Light" panose="02000000000000000000" pitchFamily="2" charset="0"/>
+                <a:ea typeface="Roboto Light" panose="02000000000000000000" pitchFamily="2" charset="0"/>
+              </a:rPr>
+              <a:t>www.github.com/nelson-group/pycourse </a:t>
+            </a:r>
+          </a:p>
+          <a:p>
+            <a:endParaRPr lang="en-US" sz="800" dirty="0">
+              <a:latin typeface="Roboto Light" panose="02000000000000000000" pitchFamily="2" charset="0"/>
+              <a:ea typeface="Roboto Light" panose="02000000000000000000" pitchFamily="2" charset="0"/>
+            </a:endParaRPr>
+          </a:p>
+          <a:p>
+            <a:r>
+              <a:rPr lang="en-US" sz="2100" dirty="0">
+                <a:latin typeface="Roboto Light" panose="02000000000000000000" pitchFamily="2" charset="0"/>
+                <a:ea typeface="Roboto Light" panose="02000000000000000000" pitchFamily="2" charset="0"/>
+              </a:rPr>
+              <a:t>including the lectures, the problem sets, and all the associated data files.</a:t>
+            </a:r>
+          </a:p>
+        </p:txBody>
+      </p:sp>
+    </p:spTree>
+    <p:extLst>
+      <p:ext uri="{BB962C8B-B14F-4D97-AF65-F5344CB8AC3E}">
+        <p14:creationId xmlns:p14="http://schemas.microsoft.com/office/powerpoint/2010/main" val="3667037049"/>
+      </p:ext>
+    </p:extLst>
+  </p:cSld>
+  <p:clrMapOvr>
+    <a:masterClrMapping/>
+  </p:clrMapOvr>
 </p:sld>
 </file>
 

</xml_diff>